<commit_message>
Update dev guide and fix diagrams for 1.3
</commit_message>
<xml_diff>
--- a/docs/diagrams/AchievementDiagrams.pptx
+++ b/docs/diagrams/AchievementDiagrams.pptx
@@ -211,7 +211,7 @@
           <a:p>
             <a:fld id="{F5CC4B3F-88C1-4FFA-B1B6-F41C21DC6924}" type="datetimeFigureOut">
               <a:rPr lang="en-US" smtClean="0"/>
-              <a:t>10/18/18</a:t>
+              <a:t>11/1/18</a:t>
             </a:fld>
             <a:endParaRPr lang="en-US"/>
           </a:p>
@@ -478,6 +478,90 @@
 </p:notesMaster>
 </file>
 
+<file path=ppt/notesSlides/notesSlide1.xml><?xml version="1.0" encoding="utf-8"?>
+<p:notes xmlns:a="http://schemas.openxmlformats.org/drawingml/2006/main" xmlns:r="http://schemas.openxmlformats.org/officeDocument/2006/relationships" xmlns:p="http://schemas.openxmlformats.org/presentationml/2006/main">
+  <p:cSld>
+    <p:spTree>
+      <p:nvGrpSpPr>
+        <p:cNvPr id="1" name=""/>
+        <p:cNvGrpSpPr/>
+        <p:nvPr/>
+      </p:nvGrpSpPr>
+      <p:grpSpPr>
+        <a:xfrm>
+          <a:off x="0" y="0"/>
+          <a:ext cx="0" cy="0"/>
+          <a:chOff x="0" y="0"/>
+          <a:chExt cx="0" cy="0"/>
+        </a:xfrm>
+      </p:grpSpPr>
+      <p:sp>
+        <p:nvSpPr>
+          <p:cNvPr id="2" name="Slide Image Placeholder 1"/>
+          <p:cNvSpPr>
+            <a:spLocks noGrp="1" noRot="1" noChangeAspect="1"/>
+          </p:cNvSpPr>
+          <p:nvPr>
+            <p:ph type="sldImg"/>
+          </p:nvPr>
+        </p:nvSpPr>
+        <p:spPr/>
+      </p:sp>
+      <p:sp>
+        <p:nvSpPr>
+          <p:cNvPr id="3" name="Notes Placeholder 2"/>
+          <p:cNvSpPr>
+            <a:spLocks noGrp="1"/>
+          </p:cNvSpPr>
+          <p:nvPr>
+            <p:ph type="body" idx="1"/>
+          </p:nvPr>
+        </p:nvSpPr>
+        <p:spPr/>
+        <p:txBody>
+          <a:bodyPr/>
+          <a:lstStyle/>
+          <a:p>
+            <a:endParaRPr lang="en-US"/>
+          </a:p>
+        </p:txBody>
+      </p:sp>
+      <p:sp>
+        <p:nvSpPr>
+          <p:cNvPr id="4" name="Slide Number Placeholder 3"/>
+          <p:cNvSpPr>
+            <a:spLocks noGrp="1"/>
+          </p:cNvSpPr>
+          <p:nvPr>
+            <p:ph type="sldNum" sz="quarter" idx="10"/>
+          </p:nvPr>
+        </p:nvSpPr>
+        <p:spPr/>
+        <p:txBody>
+          <a:bodyPr/>
+          <a:lstStyle/>
+          <a:p>
+            <a:fld id="{5A7AB025-77E3-4BD1-A2FD-B3183DBA47A3}" type="slidenum">
+              <a:rPr lang="en-US" smtClean="0"/>
+              <a:t>4</a:t>
+            </a:fld>
+            <a:endParaRPr lang="en-US"/>
+          </a:p>
+        </p:txBody>
+      </p:sp>
+    </p:spTree>
+    <p:extLst>
+      <p:ext uri="{BB962C8B-B14F-4D97-AF65-F5344CB8AC3E}">
+        <p14:creationId xmlns:p14="http://schemas.microsoft.com/office/powerpoint/2010/main" val="1600652128"/>
+      </p:ext>
+    </p:extLst>
+  </p:cSld>
+  <p:clrMapOvr>
+    <a:masterClrMapping/>
+  </p:clrMapOvr>
+</p:notes>
+</file>
+
 <file path=ppt/slideLayouts/slideLayout1.xml><?xml version="1.0" encoding="utf-8"?>
 <p:sldLayout xmlns:a="http://schemas.openxmlformats.org/drawingml/2006/main" xmlns:r="http://schemas.openxmlformats.org/officeDocument/2006/relationships" xmlns:p="http://schemas.openxmlformats.org/presentationml/2006/main" type="title" preserve="1">
   <p:cSld name="Title Slide">
@@ -657,7 +741,7 @@
           <a:p>
             <a:fld id="{78C97017-6FC3-485B-9764-EAC9E56C1D49}" type="datetimeFigureOut">
               <a:rPr lang="en-US" smtClean="0"/>
-              <a:t>10/18/18</a:t>
+              <a:t>11/1/18</a:t>
             </a:fld>
             <a:endParaRPr lang="en-US"/>
           </a:p>
@@ -825,7 +909,7 @@
           <a:p>
             <a:fld id="{78C97017-6FC3-485B-9764-EAC9E56C1D49}" type="datetimeFigureOut">
               <a:rPr lang="en-US" smtClean="0"/>
-              <a:t>10/18/18</a:t>
+              <a:t>11/1/18</a:t>
             </a:fld>
             <a:endParaRPr lang="en-US"/>
           </a:p>
@@ -1003,7 +1087,7 @@
           <a:p>
             <a:fld id="{78C97017-6FC3-485B-9764-EAC9E56C1D49}" type="datetimeFigureOut">
               <a:rPr lang="en-US" smtClean="0"/>
-              <a:t>10/18/18</a:t>
+              <a:t>11/1/18</a:t>
             </a:fld>
             <a:endParaRPr lang="en-US"/>
           </a:p>
@@ -1171,7 +1255,7 @@
           <a:p>
             <a:fld id="{78C97017-6FC3-485B-9764-EAC9E56C1D49}" type="datetimeFigureOut">
               <a:rPr lang="en-US" smtClean="0"/>
-              <a:t>10/18/18</a:t>
+              <a:t>11/1/18</a:t>
             </a:fld>
             <a:endParaRPr lang="en-US"/>
           </a:p>
@@ -1416,7 +1500,7 @@
           <a:p>
             <a:fld id="{78C97017-6FC3-485B-9764-EAC9E56C1D49}" type="datetimeFigureOut">
               <a:rPr lang="en-US" smtClean="0"/>
-              <a:t>10/18/18</a:t>
+              <a:t>11/1/18</a:t>
             </a:fld>
             <a:endParaRPr lang="en-US"/>
           </a:p>
@@ -1701,7 +1785,7 @@
           <a:p>
             <a:fld id="{78C97017-6FC3-485B-9764-EAC9E56C1D49}" type="datetimeFigureOut">
               <a:rPr lang="en-US" smtClean="0"/>
-              <a:t>10/18/18</a:t>
+              <a:t>11/1/18</a:t>
             </a:fld>
             <a:endParaRPr lang="en-US"/>
           </a:p>
@@ -2120,7 +2204,7 @@
           <a:p>
             <a:fld id="{78C97017-6FC3-485B-9764-EAC9E56C1D49}" type="datetimeFigureOut">
               <a:rPr lang="en-US" smtClean="0"/>
-              <a:t>10/18/18</a:t>
+              <a:t>11/1/18</a:t>
             </a:fld>
             <a:endParaRPr lang="en-US"/>
           </a:p>
@@ -2237,7 +2321,7 @@
           <a:p>
             <a:fld id="{78C97017-6FC3-485B-9764-EAC9E56C1D49}" type="datetimeFigureOut">
               <a:rPr lang="en-US" smtClean="0"/>
-              <a:t>10/18/18</a:t>
+              <a:t>11/1/18</a:t>
             </a:fld>
             <a:endParaRPr lang="en-US"/>
           </a:p>
@@ -2332,7 +2416,7 @@
           <a:p>
             <a:fld id="{78C97017-6FC3-485B-9764-EAC9E56C1D49}" type="datetimeFigureOut">
               <a:rPr lang="en-US" smtClean="0"/>
-              <a:t>10/18/18</a:t>
+              <a:t>11/1/18</a:t>
             </a:fld>
             <a:endParaRPr lang="en-US"/>
           </a:p>
@@ -2607,7 +2691,7 @@
           <a:p>
             <a:fld id="{78C97017-6FC3-485B-9764-EAC9E56C1D49}" type="datetimeFigureOut">
               <a:rPr lang="en-US" smtClean="0"/>
-              <a:t>10/18/18</a:t>
+              <a:t>11/1/18</a:t>
             </a:fld>
             <a:endParaRPr lang="en-US"/>
           </a:p>
@@ -2859,7 +2943,7 @@
           <a:p>
             <a:fld id="{78C97017-6FC3-485B-9764-EAC9E56C1D49}" type="datetimeFigureOut">
               <a:rPr lang="en-US" smtClean="0"/>
-              <a:t>10/18/18</a:t>
+              <a:t>11/1/18</a:t>
             </a:fld>
             <a:endParaRPr lang="en-US"/>
           </a:p>
@@ -3070,7 +3154,7 @@
           <a:p>
             <a:fld id="{78C97017-6FC3-485B-9764-EAC9E56C1D49}" type="datetimeFigureOut">
               <a:rPr lang="en-US" smtClean="0"/>
-              <a:t>10/18/18</a:t>
+              <a:t>11/1/18</a:t>
             </a:fld>
             <a:endParaRPr lang="en-US"/>
           </a:p>
@@ -3453,8 +3537,8 @@
         </p:nvSpPr>
         <p:spPr>
           <a:xfrm>
-            <a:off x="1787086" y="550084"/>
-            <a:ext cx="3903825" cy="4400926"/>
+            <a:off x="1219200" y="609600"/>
+            <a:ext cx="6241099" cy="4402916"/>
           </a:xfrm>
           <a:prstGeom prst="roundRect">
             <a:avLst>
@@ -3514,7 +3598,7 @@
         </p:nvSpPr>
         <p:spPr>
           <a:xfrm>
-            <a:off x="337797" y="1363124"/>
+            <a:off x="-194257" y="1398612"/>
             <a:ext cx="2059008" cy="184666"/>
           </a:xfrm>
           <a:prstGeom prst="rect">
@@ -3540,20 +3624,12 @@
           </a:lstStyle>
           <a:p>
             <a:r>
-              <a:rPr lang="en-US" sz="1200" dirty="0" err="1">
-                <a:solidFill>
-                  <a:srgbClr val="7030A0"/>
-                </a:solidFill>
-              </a:rPr>
-              <a:t>updateTaskStatus</a:t>
-            </a:r>
-            <a:r>
               <a:rPr lang="en-US" sz="1200" dirty="0">
                 <a:solidFill>
                   <a:srgbClr val="7030A0"/>
                 </a:solidFill>
               </a:rPr>
-              <a:t>(</a:t>
+              <a:t>updateTaskStatus(</a:t>
             </a:r>
             <a:r>
               <a:rPr lang="en-US" sz="1200" dirty="0">
@@ -3585,7 +3661,7 @@
         </p:nvSpPr>
         <p:spPr>
           <a:xfrm>
-            <a:off x="2910972" y="1266586"/>
+            <a:off x="2407376" y="1292484"/>
             <a:ext cx="2181777" cy="335427"/>
           </a:xfrm>
           <a:prstGeom prst="rect">
@@ -3626,15 +3702,7 @@
                   <a:schemeClr val="bg1"/>
                 </a:solidFill>
               </a:rPr>
-              <a:t>:</a:t>
-            </a:r>
-            <a:r>
-              <a:rPr lang="en-US" sz="1600" dirty="0" err="1">
-                <a:solidFill>
-                  <a:schemeClr val="bg1"/>
-                </a:solidFill>
-              </a:rPr>
-              <a:t>VersionedTaskManager</a:t>
+              <a:t>:VersionedTaskManager</a:t>
             </a:r>
             <a:endParaRPr lang="en-SG" sz="1600" dirty="0">
               <a:solidFill>
@@ -3652,7 +3720,7 @@
         </p:nvSpPr>
         <p:spPr>
           <a:xfrm>
-            <a:off x="3924383" y="2249294"/>
+            <a:off x="3420787" y="2275192"/>
             <a:ext cx="148703" cy="739189"/>
           </a:xfrm>
           <a:prstGeom prst="rect">
@@ -3699,7 +3767,7 @@
         </p:nvSpPr>
         <p:spPr>
           <a:xfrm>
-            <a:off x="1970493" y="1003406"/>
+            <a:off x="1466897" y="1029304"/>
             <a:ext cx="841636" cy="300180"/>
           </a:xfrm>
           <a:prstGeom prst="rect">
@@ -3761,7 +3829,7 @@
         </p:nvCxnSpPr>
         <p:spPr>
           <a:xfrm>
-            <a:off x="2391311" y="1303586"/>
+            <a:off x="1887715" y="1329484"/>
             <a:ext cx="1" cy="3481399"/>
           </a:xfrm>
           <a:prstGeom prst="line">
@@ -3798,7 +3866,7 @@
         </p:nvSpPr>
         <p:spPr>
           <a:xfrm>
-            <a:off x="2354973" y="1602013"/>
+            <a:off x="1851377" y="1627911"/>
             <a:ext cx="106270" cy="2986671"/>
           </a:xfrm>
           <a:prstGeom prst="rect">
@@ -3847,7 +3915,7 @@
         </p:nvCxnSpPr>
         <p:spPr>
           <a:xfrm>
-            <a:off x="1136104" y="1620525"/>
+            <a:off x="632508" y="1646423"/>
             <a:ext cx="1210345" cy="0"/>
           </a:xfrm>
           <a:prstGeom prst="straightConnector1">
@@ -3889,8 +3957,8 @@
         </p:nvSpPr>
         <p:spPr>
           <a:xfrm>
-            <a:off x="3065468" y="2112840"/>
-            <a:ext cx="2120786" cy="184666"/>
+            <a:off x="3337897" y="2118370"/>
+            <a:ext cx="3001266" cy="184666"/>
           </a:xfrm>
           <a:prstGeom prst="rect">
             <a:avLst/>
@@ -3915,22 +3983,13 @@
           </a:lstStyle>
           <a:p>
             <a:r>
-              <a:rPr lang="en-US" sz="1200" dirty="0" err="1">
-                <a:solidFill>
-                  <a:srgbClr val="7030A0"/>
-                </a:solidFill>
-              </a:rPr>
-              <a:t>updateXp</a:t>
-            </a:r>
-            <a:r>
               <a:rPr lang="en-US" sz="1200" dirty="0">
                 <a:solidFill>
                   <a:srgbClr val="7030A0"/>
                 </a:solidFill>
               </a:rPr>
-              <a:t>(Integer)</a:t>
-            </a:r>
-            <a:endParaRPr lang="en-US" sz="1200" dirty="0"/>
+              <a:t>incrementAchievementsWithNewXp(Integer)</a:t>
+            </a:r>
           </a:p>
         </p:txBody>
       </p:sp>
@@ -3951,7 +4010,7 @@
         </p:nvCxnSpPr>
         <p:spPr>
           <a:xfrm>
-            <a:off x="4001861" y="1602013"/>
+            <a:off x="3498265" y="1627911"/>
             <a:ext cx="8998" cy="2745265"/>
           </a:xfrm>
           <a:prstGeom prst="line">
@@ -3988,7 +4047,7 @@
         </p:nvSpPr>
         <p:spPr>
           <a:xfrm>
-            <a:off x="2384912" y="2040316"/>
+            <a:off x="1881316" y="2066214"/>
             <a:ext cx="1572215" cy="184666"/>
           </a:xfrm>
           <a:prstGeom prst="rect">
@@ -4017,12 +4076,12 @@
           </a:lstStyle>
           <a:p>
             <a:r>
-              <a:rPr lang="en-US" sz="1200" dirty="0" err="1">
+              <a:rPr lang="en-US" sz="1200" dirty="0">
                 <a:solidFill>
                   <a:srgbClr val="7030A0"/>
                 </a:solidFill>
               </a:rPr>
-              <a:t>updateXp</a:t>
+              <a:t>addXp</a:t>
             </a:r>
             <a:r>
               <a:rPr lang="en-US" sz="1200" dirty="0">
@@ -4047,7 +4106,7 @@
         </p:nvCxnSpPr>
         <p:spPr>
           <a:xfrm>
-            <a:off x="2486911" y="2249294"/>
+            <a:off x="1983315" y="2275192"/>
             <a:ext cx="1470216" cy="0"/>
           </a:xfrm>
           <a:prstGeom prst="straightConnector1">
@@ -4091,7 +4150,7 @@
         </p:nvCxnSpPr>
         <p:spPr>
           <a:xfrm flipV="1">
-            <a:off x="2486911" y="2988483"/>
+            <a:off x="1983315" y="3014381"/>
             <a:ext cx="1470216" cy="6325"/>
           </a:xfrm>
           <a:prstGeom prst="straightConnector1">
@@ -4137,7 +4196,7 @@
         </p:nvCxnSpPr>
         <p:spPr>
           <a:xfrm>
-            <a:off x="1039144" y="4588684"/>
+            <a:off x="535548" y="4614582"/>
             <a:ext cx="1326499" cy="0"/>
           </a:xfrm>
           <a:prstGeom prst="straightConnector1">
@@ -4183,8 +4242,8 @@
         </p:nvCxnSpPr>
         <p:spPr>
           <a:xfrm>
-            <a:off x="4022093" y="2345716"/>
-            <a:ext cx="1070656" cy="0"/>
+            <a:off x="3569490" y="2371614"/>
+            <a:ext cx="2411622" cy="0"/>
           </a:xfrm>
           <a:prstGeom prst="straightConnector1">
             <a:avLst/>
@@ -4225,7 +4284,7 @@
         </p:nvSpPr>
         <p:spPr>
           <a:xfrm>
-            <a:off x="5060526" y="2325349"/>
+            <a:off x="5981112" y="2351247"/>
             <a:ext cx="129933" cy="398562"/>
           </a:xfrm>
           <a:prstGeom prst="rect">
@@ -4275,13 +4334,14 @@
           </p:cNvPr>
           <p:cNvCxnSpPr>
             <a:cxnSpLocks/>
+            <a:endCxn id="48" idx="2"/>
           </p:cNvCxnSpPr>
           <p:nvPr/>
         </p:nvCxnSpPr>
         <p:spPr>
-          <a:xfrm>
-            <a:off x="4087060" y="2716483"/>
-            <a:ext cx="964942" cy="1"/>
+          <a:xfrm flipV="1">
+            <a:off x="3545525" y="2749809"/>
+            <a:ext cx="2500554" cy="4599"/>
           </a:xfrm>
           <a:prstGeom prst="straightConnector1">
             <a:avLst/>
@@ -4324,7 +4384,7 @@
         </p:nvSpPr>
         <p:spPr>
           <a:xfrm>
-            <a:off x="4257076" y="1689713"/>
+            <a:off x="5177662" y="1715611"/>
             <a:ext cx="2181777" cy="335427"/>
           </a:xfrm>
           <a:prstGeom prst="rect">
@@ -4365,15 +4425,7 @@
                   <a:schemeClr val="bg1"/>
                 </a:solidFill>
               </a:rPr>
-              <a:t>:</a:t>
-            </a:r>
-            <a:r>
-              <a:rPr lang="en-US" sz="1600" dirty="0" err="1">
-                <a:solidFill>
-                  <a:schemeClr val="bg1"/>
-                </a:solidFill>
-              </a:rPr>
-              <a:t>AchievementRecord</a:t>
+              <a:t>:AchievementRecord</a:t>
             </a:r>
             <a:endParaRPr lang="en-SG" sz="1600" dirty="0">
               <a:solidFill>
@@ -4399,7 +4451,7 @@
         </p:nvCxnSpPr>
         <p:spPr>
           <a:xfrm>
-            <a:off x="5128107" y="2025140"/>
+            <a:off x="6048693" y="2051038"/>
             <a:ext cx="8998" cy="2745265"/>
           </a:xfrm>
           <a:prstGeom prst="line">
@@ -4442,7 +4494,7 @@
         </p:nvSpPr>
         <p:spPr>
           <a:xfrm>
-            <a:off x="4682686" y="3534805"/>
+            <a:off x="5635844" y="3272696"/>
             <a:ext cx="2915344" cy="215444"/>
           </a:xfrm>
           <a:prstGeom prst="rect">
@@ -4464,27 +4516,7 @@
                   </a:schemeClr>
                 </a:solidFill>
               </a:rPr>
-              <a:t>post(</a:t>
-            </a:r>
-            <a:r>
-              <a:rPr lang="en-US" sz="1400" dirty="0" err="1">
-                <a:solidFill>
-                  <a:schemeClr val="accent5">
-                    <a:lumMod val="75000"/>
-                  </a:schemeClr>
-                </a:solidFill>
-              </a:rPr>
-              <a:t>AchievementLevelChangedEvent</a:t>
-            </a:r>
-            <a:r>
-              <a:rPr lang="en-US" sz="1400" dirty="0">
-                <a:solidFill>
-                  <a:schemeClr val="accent5">
-                    <a:lumMod val="75000"/>
-                  </a:schemeClr>
-                </a:solidFill>
-              </a:rPr>
-              <a:t>)</a:t>
+              <a:t>post(AchievementsUpdatedEvent)</a:t>
             </a:r>
           </a:p>
         </p:txBody>
@@ -4503,7 +4535,7 @@
         </p:nvSpPr>
         <p:spPr>
           <a:xfrm>
-            <a:off x="6781800" y="2438400"/>
+            <a:off x="7551839" y="2464298"/>
             <a:ext cx="1371600" cy="346760"/>
           </a:xfrm>
           <a:prstGeom prst="rect">
@@ -4548,15 +4580,7 @@
                   <a:schemeClr val="bg1"/>
                 </a:solidFill>
               </a:rPr>
-              <a:t>:</a:t>
-            </a:r>
-            <a:r>
-              <a:rPr lang="en-US" sz="1600" dirty="0" err="1">
-                <a:solidFill>
-                  <a:schemeClr val="bg1"/>
-                </a:solidFill>
-              </a:rPr>
-              <a:t>EventsCenter</a:t>
+              <a:t>:EventsCenter</a:t>
             </a:r>
             <a:endParaRPr lang="en-SG" sz="1600" dirty="0">
               <a:solidFill>
@@ -4580,7 +4604,7 @@
         </p:nvCxnSpPr>
         <p:spPr>
           <a:xfrm>
-            <a:off x="7702402" y="2791454"/>
+            <a:off x="8234441" y="2817352"/>
             <a:ext cx="0" cy="1723059"/>
           </a:xfrm>
           <a:prstGeom prst="line">
@@ -4625,8 +4649,8 @@
         </p:nvSpPr>
         <p:spPr>
           <a:xfrm>
-            <a:off x="7630394" y="3808351"/>
-            <a:ext cx="142006" cy="176787"/>
+            <a:off x="8162433" y="3544791"/>
+            <a:ext cx="142006" cy="466246"/>
           </a:xfrm>
           <a:prstGeom prst="rect">
             <a:avLst/>
@@ -4688,8 +4712,8 @@
         </p:nvCxnSpPr>
         <p:spPr>
           <a:xfrm>
-            <a:off x="2493607" y="3837519"/>
-            <a:ext cx="5136787" cy="0"/>
+            <a:off x="1983315" y="3544790"/>
+            <a:ext cx="6159586" cy="0"/>
           </a:xfrm>
           <a:prstGeom prst="straightConnector1">
             <a:avLst/>
@@ -4727,13 +4751,14 @@
           </p:cNvPr>
           <p:cNvCxnSpPr>
             <a:cxnSpLocks/>
+            <a:endCxn id="62" idx="2"/>
           </p:cNvCxnSpPr>
           <p:nvPr/>
         </p:nvCxnSpPr>
         <p:spPr>
           <a:xfrm>
-            <a:off x="2431925" y="3985138"/>
-            <a:ext cx="5240154" cy="0"/>
+            <a:off x="1957647" y="4011037"/>
+            <a:ext cx="6275789" cy="0"/>
           </a:xfrm>
           <a:prstGeom prst="straightConnector1">
             <a:avLst/>
@@ -4764,262 +4789,6 @@
           </a:fontRef>
         </p:style>
       </p:cxnSp>
-      <p:sp>
-        <p:nvSpPr>
-          <p:cNvPr id="24" name="Rectangle 23">
-            <a:extLst>
-              <a:ext uri="{FF2B5EF4-FFF2-40B4-BE49-F238E27FC236}">
-                <a16:creationId xmlns:a16="http://schemas.microsoft.com/office/drawing/2014/main" id="{C03CAEE8-ADA1-DF4B-BDED-034F755F7322}"/>
-              </a:ext>
-            </a:extLst>
-          </p:cNvPr>
-          <p:cNvSpPr/>
-          <p:nvPr/>
-        </p:nvSpPr>
-        <p:spPr>
-          <a:xfrm>
-            <a:off x="1970493" y="3397772"/>
-            <a:ext cx="6293593" cy="809912"/>
-          </a:xfrm>
-          <a:prstGeom prst="rect">
-            <a:avLst/>
-          </a:prstGeom>
-          <a:noFill/>
-          <a:ln>
-            <a:solidFill>
-              <a:srgbClr val="C00000"/>
-            </a:solidFill>
-          </a:ln>
-        </p:spPr>
-        <p:style>
-          <a:lnRef idx="2">
-            <a:schemeClr val="accent1">
-              <a:shade val="50000"/>
-            </a:schemeClr>
-          </a:lnRef>
-          <a:fillRef idx="1">
-            <a:schemeClr val="accent1"/>
-          </a:fillRef>
-          <a:effectRef idx="0">
-            <a:schemeClr val="accent1"/>
-          </a:effectRef>
-          <a:fontRef idx="minor">
-            <a:schemeClr val="lt1"/>
-          </a:fontRef>
-        </p:style>
-        <p:txBody>
-          <a:bodyPr rtlCol="0" anchor="ctr"/>
-          <a:lstStyle/>
-          <a:p>
-            <a:pPr algn="ctr"/>
-            <a:endParaRPr lang="en-US"/>
-          </a:p>
-        </p:txBody>
-      </p:sp>
-      <p:cxnSp>
-        <p:nvCxnSpPr>
-          <p:cNvPr id="30" name="Straight Connector 29">
-            <a:extLst>
-              <a:ext uri="{FF2B5EF4-FFF2-40B4-BE49-F238E27FC236}">
-                <a16:creationId xmlns:a16="http://schemas.microsoft.com/office/drawing/2014/main" id="{C9C2B77F-882C-844E-82E3-93DF301FEB3A}"/>
-              </a:ext>
-            </a:extLst>
-          </p:cNvPr>
-          <p:cNvCxnSpPr/>
-          <p:nvPr/>
-        </p:nvCxnSpPr>
-        <p:spPr>
-          <a:xfrm>
-            <a:off x="1970493" y="3642527"/>
-            <a:ext cx="654793" cy="0"/>
-          </a:xfrm>
-          <a:prstGeom prst="line">
-            <a:avLst/>
-          </a:prstGeom>
-          <a:ln>
-            <a:solidFill>
-              <a:srgbClr val="C00000"/>
-            </a:solidFill>
-          </a:ln>
-        </p:spPr>
-        <p:style>
-          <a:lnRef idx="1">
-            <a:schemeClr val="accent1"/>
-          </a:lnRef>
-          <a:fillRef idx="0">
-            <a:schemeClr val="accent1"/>
-          </a:fillRef>
-          <a:effectRef idx="0">
-            <a:schemeClr val="accent1"/>
-          </a:effectRef>
-          <a:fontRef idx="minor">
-            <a:schemeClr val="tx1"/>
-          </a:fontRef>
-        </p:style>
-      </p:cxnSp>
-      <p:cxnSp>
-        <p:nvCxnSpPr>
-          <p:cNvPr id="32" name="Straight Connector 31">
-            <a:extLst>
-              <a:ext uri="{FF2B5EF4-FFF2-40B4-BE49-F238E27FC236}">
-                <a16:creationId xmlns:a16="http://schemas.microsoft.com/office/drawing/2014/main" id="{B8E915D2-C6F9-F241-A1F2-BF6C7228CA9F}"/>
-              </a:ext>
-            </a:extLst>
-          </p:cNvPr>
-          <p:cNvCxnSpPr/>
-          <p:nvPr/>
-        </p:nvCxnSpPr>
-        <p:spPr>
-          <a:xfrm>
-            <a:off x="2694770" y="3397772"/>
-            <a:ext cx="0" cy="137033"/>
-          </a:xfrm>
-          <a:prstGeom prst="line">
-            <a:avLst/>
-          </a:prstGeom>
-          <a:ln>
-            <a:solidFill>
-              <a:srgbClr val="C00000"/>
-            </a:solidFill>
-          </a:ln>
-        </p:spPr>
-        <p:style>
-          <a:lnRef idx="1">
-            <a:schemeClr val="accent1"/>
-          </a:lnRef>
-          <a:fillRef idx="0">
-            <a:schemeClr val="accent1"/>
-          </a:fillRef>
-          <a:effectRef idx="0">
-            <a:schemeClr val="accent1"/>
-          </a:effectRef>
-          <a:fontRef idx="minor">
-            <a:schemeClr val="tx1"/>
-          </a:fontRef>
-        </p:style>
-      </p:cxnSp>
-      <p:cxnSp>
-        <p:nvCxnSpPr>
-          <p:cNvPr id="36" name="Straight Connector 35">
-            <a:extLst>
-              <a:ext uri="{FF2B5EF4-FFF2-40B4-BE49-F238E27FC236}">
-                <a16:creationId xmlns:a16="http://schemas.microsoft.com/office/drawing/2014/main" id="{943CCBAA-BDD8-FD4A-A76C-89828B58413C}"/>
-              </a:ext>
-            </a:extLst>
-          </p:cNvPr>
-          <p:cNvCxnSpPr/>
-          <p:nvPr/>
-        </p:nvCxnSpPr>
-        <p:spPr>
-          <a:xfrm flipH="1">
-            <a:off x="2611860" y="3534805"/>
-            <a:ext cx="82910" cy="118178"/>
-          </a:xfrm>
-          <a:prstGeom prst="line">
-            <a:avLst/>
-          </a:prstGeom>
-          <a:ln>
-            <a:solidFill>
-              <a:srgbClr val="C00000"/>
-            </a:solidFill>
-          </a:ln>
-        </p:spPr>
-        <p:style>
-          <a:lnRef idx="1">
-            <a:schemeClr val="accent1"/>
-          </a:lnRef>
-          <a:fillRef idx="0">
-            <a:schemeClr val="accent1"/>
-          </a:fillRef>
-          <a:effectRef idx="0">
-            <a:schemeClr val="accent1"/>
-          </a:effectRef>
-          <a:fontRef idx="minor">
-            <a:schemeClr val="tx1"/>
-          </a:fontRef>
-        </p:style>
-      </p:cxnSp>
-      <p:sp>
-        <p:nvSpPr>
-          <p:cNvPr id="38" name="TextBox 37">
-            <a:extLst>
-              <a:ext uri="{FF2B5EF4-FFF2-40B4-BE49-F238E27FC236}">
-                <a16:creationId xmlns:a16="http://schemas.microsoft.com/office/drawing/2014/main" id="{E133A514-3034-4645-8C25-4D79BB44D3CE}"/>
-              </a:ext>
-            </a:extLst>
-          </p:cNvPr>
-          <p:cNvSpPr txBox="1"/>
-          <p:nvPr/>
-        </p:nvSpPr>
-        <p:spPr>
-          <a:xfrm>
-            <a:off x="1938930" y="3350832"/>
-            <a:ext cx="469103" cy="338554"/>
-          </a:xfrm>
-          <a:prstGeom prst="rect">
-            <a:avLst/>
-          </a:prstGeom>
-          <a:noFill/>
-          <a:ln>
-            <a:noFill/>
-          </a:ln>
-        </p:spPr>
-        <p:txBody>
-          <a:bodyPr wrap="none" rtlCol="0">
-            <a:spAutoFit/>
-          </a:bodyPr>
-          <a:lstStyle/>
-          <a:p>
-            <a:r>
-              <a:rPr lang="en-US" sz="1600" dirty="0">
-                <a:solidFill>
-                  <a:srgbClr val="FF0000"/>
-                </a:solidFill>
-              </a:rPr>
-              <a:t>opt</a:t>
-            </a:r>
-          </a:p>
-        </p:txBody>
-      </p:sp>
-      <p:sp>
-        <p:nvSpPr>
-          <p:cNvPr id="39" name="TextBox 38">
-            <a:extLst>
-              <a:ext uri="{FF2B5EF4-FFF2-40B4-BE49-F238E27FC236}">
-                <a16:creationId xmlns:a16="http://schemas.microsoft.com/office/drawing/2014/main" id="{FA651946-D5AD-ED46-8D54-4BF1EB5F2787}"/>
-              </a:ext>
-            </a:extLst>
-          </p:cNvPr>
-          <p:cNvSpPr txBox="1"/>
-          <p:nvPr/>
-        </p:nvSpPr>
-        <p:spPr>
-          <a:xfrm>
-            <a:off x="2653315" y="3358437"/>
-            <a:ext cx="1294650" cy="307777"/>
-          </a:xfrm>
-          <a:prstGeom prst="rect">
-            <a:avLst/>
-          </a:prstGeom>
-          <a:noFill/>
-        </p:spPr>
-        <p:txBody>
-          <a:bodyPr wrap="none" rtlCol="0">
-            <a:spAutoFit/>
-          </a:bodyPr>
-          <a:lstStyle/>
-          <a:p>
-            <a:r>
-              <a:rPr lang="en-US" sz="1400" dirty="0">
-                <a:solidFill>
-                  <a:srgbClr val="FF0000"/>
-                </a:solidFill>
-              </a:rPr>
-              <a:t>[level changed]</a:t>
-            </a:r>
-          </a:p>
-        </p:txBody>
-      </p:sp>
     </p:spTree>
     <p:extLst>
       <p:ext uri="{BB962C8B-B14F-4D97-AF65-F5344CB8AC3E}">
@@ -5064,8 +4833,8 @@
         </p:nvSpPr>
         <p:spPr>
           <a:xfrm>
-            <a:off x="2862514" y="1797841"/>
-            <a:ext cx="2978469" cy="215444"/>
+            <a:off x="914400" y="3080227"/>
+            <a:ext cx="2978469" cy="200055"/>
           </a:xfrm>
           <a:prstGeom prst="rect">
             <a:avLst/>
@@ -5079,44 +4848,24 @@
           <a:lstStyle/>
           <a:p>
             <a:r>
-              <a:rPr lang="en-US" sz="1400" dirty="0">
+              <a:rPr lang="en-US" sz="1300" dirty="0">
                 <a:solidFill>
                   <a:schemeClr val="accent5">
                     <a:lumMod val="75000"/>
                   </a:schemeClr>
                 </a:solidFill>
               </a:rPr>
-              <a:t>post(</a:t>
-            </a:r>
-            <a:r>
-              <a:rPr lang="en-US" sz="1400" dirty="0" err="1">
-                <a:solidFill>
-                  <a:schemeClr val="accent5">
-                    <a:lumMod val="75000"/>
-                  </a:schemeClr>
-                </a:solidFill>
-              </a:rPr>
-              <a:t>AchievementLevelChangedEvent</a:t>
-            </a:r>
-            <a:r>
-              <a:rPr lang="en-US" sz="1400" dirty="0">
-                <a:solidFill>
-                  <a:schemeClr val="accent5">
-                    <a:lumMod val="75000"/>
-                  </a:schemeClr>
-                </a:solidFill>
-              </a:rPr>
-              <a:t>)</a:t>
-            </a:r>
-          </a:p>
-        </p:txBody>
-      </p:sp>
-      <p:sp>
-        <p:nvSpPr>
-          <p:cNvPr id="3" name="Rectangle 62">
-            <a:extLst>
-              <a:ext uri="{FF2B5EF4-FFF2-40B4-BE49-F238E27FC236}">
-                <a16:creationId xmlns:a16="http://schemas.microsoft.com/office/drawing/2014/main" id="{57FEF341-6DE0-CA44-9AEA-7DA660FB74D9}"/>
+              <a:t>post(AchievementsUpdatedEvent)</a:t>
+            </a:r>
+          </a:p>
+        </p:txBody>
+      </p:sp>
+      <p:sp>
+        <p:nvSpPr>
+          <p:cNvPr id="8" name="Rectangle 62">
+            <a:extLst>
+              <a:ext uri="{FF2B5EF4-FFF2-40B4-BE49-F238E27FC236}">
+                <a16:creationId xmlns:a16="http://schemas.microsoft.com/office/drawing/2014/main" id="{B3C3E4DD-50CA-EA48-B5A2-F8900D9DB4BC}"/>
               </a:ext>
             </a:extLst>
           </p:cNvPr>
@@ -5125,22 +4874,18 @@
         </p:nvSpPr>
         <p:spPr>
           <a:xfrm>
-            <a:off x="5105400" y="1295400"/>
-            <a:ext cx="1371600" cy="346760"/>
+            <a:off x="5746003" y="2590800"/>
+            <a:ext cx="1093635" cy="346760"/>
           </a:xfrm>
           <a:prstGeom prst="rect">
             <a:avLst/>
           </a:prstGeom>
           <a:solidFill>
-            <a:schemeClr val="accent5">
-              <a:lumMod val="75000"/>
-            </a:schemeClr>
+            <a:srgbClr val="00B050"/>
           </a:solidFill>
           <a:ln w="19050">
             <a:solidFill>
-              <a:schemeClr val="accent5">
-                <a:lumMod val="75000"/>
-              </a:schemeClr>
+              <a:srgbClr val="00B050"/>
             </a:solidFill>
           </a:ln>
           <a:effectLst/>
@@ -5170,15 +4915,7 @@
                   <a:schemeClr val="bg1"/>
                 </a:solidFill>
               </a:rPr>
-              <a:t>:</a:t>
-            </a:r>
-            <a:r>
-              <a:rPr lang="en-US" sz="1600" dirty="0" err="1">
-                <a:solidFill>
-                  <a:schemeClr val="bg1"/>
-                </a:solidFill>
-              </a:rPr>
-              <a:t>EventsCenter</a:t>
+              <a:t>:UI</a:t>
             </a:r>
             <a:endParaRPr lang="en-SG" sz="1600" dirty="0">
               <a:solidFill>
@@ -5190,19 +4927,21 @@
       </p:sp>
       <p:cxnSp>
         <p:nvCxnSpPr>
-          <p:cNvPr id="4" name="Straight Connector 3">
-            <a:extLst>
-              <a:ext uri="{FF2B5EF4-FFF2-40B4-BE49-F238E27FC236}">
-                <a16:creationId xmlns:a16="http://schemas.microsoft.com/office/drawing/2014/main" id="{E84D3480-4597-494A-8476-819BCA70CCC6}"/>
-              </a:ext>
-            </a:extLst>
-          </p:cNvPr>
-          <p:cNvCxnSpPr/>
+          <p:cNvPr id="9" name="Straight Connector 8">
+            <a:extLst>
+              <a:ext uri="{FF2B5EF4-FFF2-40B4-BE49-F238E27FC236}">
+                <a16:creationId xmlns:a16="http://schemas.microsoft.com/office/drawing/2014/main" id="{0FA06AF0-D99A-BC4E-A2D8-D267C721ADAB}"/>
+              </a:ext>
+            </a:extLst>
+          </p:cNvPr>
+          <p:cNvCxnSpPr>
+            <a:cxnSpLocks/>
+          </p:cNvCxnSpPr>
           <p:nvPr/>
         </p:nvCxnSpPr>
         <p:spPr>
           <a:xfrm>
-            <a:off x="5770985" y="1648454"/>
+            <a:off x="6292820" y="2954471"/>
             <a:ext cx="0" cy="1723059"/>
           </a:xfrm>
           <a:prstGeom prst="line">
@@ -5210,9 +4949,7 @@
           </a:prstGeom>
           <a:ln w="19050">
             <a:solidFill>
-              <a:schemeClr val="accent5">
-                <a:lumMod val="75000"/>
-              </a:schemeClr>
+              <a:srgbClr val="00B050"/>
             </a:solidFill>
             <a:prstDash val="sysDash"/>
           </a:ln>
@@ -5235,10 +4972,10 @@
       </p:cxnSp>
       <p:sp>
         <p:nvSpPr>
-          <p:cNvPr id="5" name="Rectangle 4">
-            <a:extLst>
-              <a:ext uri="{FF2B5EF4-FFF2-40B4-BE49-F238E27FC236}">
-                <a16:creationId xmlns:a16="http://schemas.microsoft.com/office/drawing/2014/main" id="{A2878836-A9A6-8F47-8BE2-0BB1FD5E3635}"/>
+          <p:cNvPr id="10" name="Rectangle 9">
+            <a:extLst>
+              <a:ext uri="{FF2B5EF4-FFF2-40B4-BE49-F238E27FC236}">
+                <a16:creationId xmlns:a16="http://schemas.microsoft.com/office/drawing/2014/main" id="{2FF088D6-1BAA-F44D-B4C5-2D035A9655FD}"/>
               </a:ext>
             </a:extLst>
           </p:cNvPr>
@@ -5247,22 +4984,18 @@
         </p:nvSpPr>
         <p:spPr>
           <a:xfrm>
-            <a:off x="5698977" y="2071387"/>
-            <a:ext cx="142006" cy="1036757"/>
+            <a:off x="6235007" y="3569211"/>
+            <a:ext cx="116350" cy="686867"/>
           </a:xfrm>
           <a:prstGeom prst="rect">
             <a:avLst/>
           </a:prstGeom>
           <a:solidFill>
-            <a:schemeClr val="accent5">
-              <a:lumMod val="75000"/>
-            </a:schemeClr>
+            <a:srgbClr val="00B050"/>
           </a:solidFill>
           <a:ln>
             <a:solidFill>
-              <a:schemeClr val="accent5">
-                <a:lumMod val="75000"/>
-              </a:schemeClr>
+              <a:srgbClr val="00B050"/>
             </a:solidFill>
           </a:ln>
           <a:effectLst/>
@@ -5296,273 +5029,23 @@
       </p:sp>
       <p:cxnSp>
         <p:nvCxnSpPr>
-          <p:cNvPr id="6" name="Straight Arrow Connector 5">
-            <a:extLst>
-              <a:ext uri="{FF2B5EF4-FFF2-40B4-BE49-F238E27FC236}">
-                <a16:creationId xmlns:a16="http://schemas.microsoft.com/office/drawing/2014/main" id="{32A0177F-9A5D-8C4D-A164-B220889971F3}"/>
-              </a:ext>
-            </a:extLst>
-          </p:cNvPr>
-          <p:cNvCxnSpPr/>
+          <p:cNvPr id="11" name="Straight Arrow Connector 10">
+            <a:extLst>
+              <a:ext uri="{FF2B5EF4-FFF2-40B4-BE49-F238E27FC236}">
+                <a16:creationId xmlns:a16="http://schemas.microsoft.com/office/drawing/2014/main" id="{BD131A1E-DAD2-A343-BFFA-3784087E4A57}"/>
+              </a:ext>
+            </a:extLst>
+          </p:cNvPr>
+          <p:cNvCxnSpPr>
+            <a:cxnSpLocks/>
+            <a:endCxn id="10" idx="2"/>
+          </p:cNvCxnSpPr>
           <p:nvPr/>
         </p:nvCxnSpPr>
         <p:spPr>
           <a:xfrm>
-            <a:off x="4393183" y="2071387"/>
-            <a:ext cx="1295400" cy="0"/>
-          </a:xfrm>
-          <a:prstGeom prst="straightConnector1">
-            <a:avLst/>
-          </a:prstGeom>
-          <a:ln w="19050">
-            <a:solidFill>
-              <a:srgbClr val="7030A0"/>
-            </a:solidFill>
-            <a:tailEnd type="arrow"/>
-          </a:ln>
-        </p:spPr>
-        <p:style>
-          <a:lnRef idx="1">
-            <a:schemeClr val="accent1"/>
-          </a:lnRef>
-          <a:fillRef idx="0">
-            <a:schemeClr val="accent1"/>
-          </a:fillRef>
-          <a:effectRef idx="0">
-            <a:schemeClr val="accent1"/>
-          </a:effectRef>
-          <a:fontRef idx="minor">
-            <a:schemeClr val="tx1"/>
-          </a:fontRef>
-        </p:style>
-      </p:cxnSp>
-      <p:cxnSp>
-        <p:nvCxnSpPr>
-          <p:cNvPr id="7" name="Straight Arrow Connector 6">
-            <a:extLst>
-              <a:ext uri="{FF2B5EF4-FFF2-40B4-BE49-F238E27FC236}">
-                <a16:creationId xmlns:a16="http://schemas.microsoft.com/office/drawing/2014/main" id="{4D98FF44-4AFA-1046-BB7E-87B8B4E42327}"/>
-              </a:ext>
-            </a:extLst>
-          </p:cNvPr>
-          <p:cNvCxnSpPr/>
-          <p:nvPr/>
-        </p:nvCxnSpPr>
-        <p:spPr>
-          <a:xfrm>
-            <a:off x="4289896" y="3108144"/>
-            <a:ext cx="1448755" cy="0"/>
-          </a:xfrm>
-          <a:prstGeom prst="straightConnector1">
-            <a:avLst/>
-          </a:prstGeom>
-          <a:ln w="19050">
-            <a:solidFill>
-              <a:schemeClr val="accent5">
-                <a:lumMod val="75000"/>
-              </a:schemeClr>
-            </a:solidFill>
-            <a:prstDash val="sysDash"/>
-            <a:headEnd type="arrow" w="med" len="med"/>
-            <a:tailEnd type="none" w="med" len="med"/>
-          </a:ln>
-        </p:spPr>
-        <p:style>
-          <a:lnRef idx="1">
-            <a:schemeClr val="accent1"/>
-          </a:lnRef>
-          <a:fillRef idx="0">
-            <a:schemeClr val="accent1"/>
-          </a:fillRef>
-          <a:effectRef idx="0">
-            <a:schemeClr val="accent1"/>
-          </a:effectRef>
-          <a:fontRef idx="minor">
-            <a:schemeClr val="tx1"/>
-          </a:fontRef>
-        </p:style>
-      </p:cxnSp>
-      <p:sp>
-        <p:nvSpPr>
-          <p:cNvPr id="8" name="Rectangle 62">
-            <a:extLst>
-              <a:ext uri="{FF2B5EF4-FFF2-40B4-BE49-F238E27FC236}">
-                <a16:creationId xmlns:a16="http://schemas.microsoft.com/office/drawing/2014/main" id="{B3C3E4DD-50CA-EA48-B5A2-F8900D9DB4BC}"/>
-              </a:ext>
-            </a:extLst>
-          </p:cNvPr>
-          <p:cNvSpPr/>
-          <p:nvPr/>
-        </p:nvSpPr>
-        <p:spPr>
-          <a:xfrm>
-            <a:off x="2035888" y="1278489"/>
-            <a:ext cx="1093635" cy="346760"/>
-          </a:xfrm>
-          <a:prstGeom prst="rect">
-            <a:avLst/>
-          </a:prstGeom>
-          <a:solidFill>
-            <a:srgbClr val="00B050"/>
-          </a:solidFill>
-          <a:ln w="19050">
-            <a:solidFill>
-              <a:srgbClr val="00B050"/>
-            </a:solidFill>
-          </a:ln>
-          <a:effectLst/>
-        </p:spPr>
-        <p:style>
-          <a:lnRef idx="1">
-            <a:schemeClr val="accent2"/>
-          </a:lnRef>
-          <a:fillRef idx="2">
-            <a:schemeClr val="accent2"/>
-          </a:fillRef>
-          <a:effectRef idx="1">
-            <a:schemeClr val="accent2"/>
-          </a:effectRef>
-          <a:fontRef idx="minor">
-            <a:schemeClr val="dk1"/>
-          </a:fontRef>
-        </p:style>
-        <p:txBody>
-          <a:bodyPr rtlCol="0" anchor="ctr"/>
-          <a:lstStyle/>
-          <a:p>
-            <a:pPr algn="ctr"/>
-            <a:r>
-              <a:rPr lang="en-US" sz="1600" dirty="0">
-                <a:solidFill>
-                  <a:schemeClr val="bg1"/>
-                </a:solidFill>
-              </a:rPr>
-              <a:t>:UI</a:t>
-            </a:r>
-            <a:endParaRPr lang="en-SG" sz="1600" dirty="0">
-              <a:solidFill>
-                <a:schemeClr val="bg1"/>
-              </a:solidFill>
-            </a:endParaRPr>
-          </a:p>
-        </p:txBody>
-      </p:sp>
-      <p:cxnSp>
-        <p:nvCxnSpPr>
-          <p:cNvPr id="9" name="Straight Connector 8">
-            <a:extLst>
-              <a:ext uri="{FF2B5EF4-FFF2-40B4-BE49-F238E27FC236}">
-                <a16:creationId xmlns:a16="http://schemas.microsoft.com/office/drawing/2014/main" id="{0FA06AF0-D99A-BC4E-A2D8-D267C721ADAB}"/>
-              </a:ext>
-            </a:extLst>
-          </p:cNvPr>
-          <p:cNvCxnSpPr/>
-          <p:nvPr/>
-        </p:nvCxnSpPr>
-        <p:spPr>
-          <a:xfrm>
-            <a:off x="2582705" y="1642160"/>
-            <a:ext cx="0" cy="1723059"/>
-          </a:xfrm>
-          <a:prstGeom prst="line">
-            <a:avLst/>
-          </a:prstGeom>
-          <a:ln w="19050">
-            <a:solidFill>
-              <a:srgbClr val="00B050"/>
-            </a:solidFill>
-            <a:prstDash val="sysDash"/>
-          </a:ln>
-          <a:effectLst/>
-        </p:spPr>
-        <p:style>
-          <a:lnRef idx="1">
-            <a:schemeClr val="accent1"/>
-          </a:lnRef>
-          <a:fillRef idx="2">
-            <a:schemeClr val="accent1"/>
-          </a:fillRef>
-          <a:effectRef idx="1">
-            <a:schemeClr val="accent1"/>
-          </a:effectRef>
-          <a:fontRef idx="minor">
-            <a:schemeClr val="dk1"/>
-          </a:fontRef>
-        </p:style>
-      </p:cxnSp>
-      <p:sp>
-        <p:nvSpPr>
-          <p:cNvPr id="10" name="Rectangle 9">
-            <a:extLst>
-              <a:ext uri="{FF2B5EF4-FFF2-40B4-BE49-F238E27FC236}">
-                <a16:creationId xmlns:a16="http://schemas.microsoft.com/office/drawing/2014/main" id="{2FF088D6-1BAA-F44D-B4C5-2D035A9655FD}"/>
-              </a:ext>
-            </a:extLst>
-          </p:cNvPr>
-          <p:cNvSpPr/>
-          <p:nvPr/>
-        </p:nvSpPr>
-        <p:spPr>
-          <a:xfrm>
-            <a:off x="2510697" y="2670639"/>
-            <a:ext cx="130545" cy="273128"/>
-          </a:xfrm>
-          <a:prstGeom prst="rect">
-            <a:avLst/>
-          </a:prstGeom>
-          <a:solidFill>
-            <a:srgbClr val="00B050"/>
-          </a:solidFill>
-          <a:ln>
-            <a:solidFill>
-              <a:srgbClr val="00B050"/>
-            </a:solidFill>
-          </a:ln>
-          <a:effectLst/>
-        </p:spPr>
-        <p:style>
-          <a:lnRef idx="1">
-            <a:schemeClr val="accent3"/>
-          </a:lnRef>
-          <a:fillRef idx="2">
-            <a:schemeClr val="accent3"/>
-          </a:fillRef>
-          <a:effectRef idx="1">
-            <a:schemeClr val="accent3"/>
-          </a:effectRef>
-          <a:fontRef idx="minor">
-            <a:schemeClr val="dk1"/>
-          </a:fontRef>
-        </p:style>
-        <p:txBody>
-          <a:bodyPr rtlCol="0" anchor="ctr"/>
-          <a:lstStyle/>
-          <a:p>
-            <a:pPr algn="ctr"/>
-            <a:endParaRPr lang="en-SG" sz="1400">
-              <a:solidFill>
-                <a:schemeClr val="dk1"/>
-              </a:solidFill>
-            </a:endParaRPr>
-          </a:p>
-        </p:txBody>
-      </p:sp>
-      <p:cxnSp>
-        <p:nvCxnSpPr>
-          <p:cNvPr id="11" name="Straight Arrow Connector 10">
-            <a:extLst>
-              <a:ext uri="{FF2B5EF4-FFF2-40B4-BE49-F238E27FC236}">
-                <a16:creationId xmlns:a16="http://schemas.microsoft.com/office/drawing/2014/main" id="{BD131A1E-DAD2-A343-BFFA-3784087E4A57}"/>
-              </a:ext>
-            </a:extLst>
-          </p:cNvPr>
-          <p:cNvCxnSpPr/>
-          <p:nvPr/>
-        </p:nvCxnSpPr>
-        <p:spPr>
-          <a:xfrm flipH="1">
-            <a:off x="2663097" y="2943767"/>
-            <a:ext cx="3061842" cy="0"/>
+            <a:off x="3324311" y="4256078"/>
+            <a:ext cx="2968871" cy="0"/>
           </a:xfrm>
           <a:prstGeom prst="straightConnector1">
             <a:avLst/>
@@ -5600,13 +5083,15 @@
               </a:ext>
             </a:extLst>
           </p:cNvPr>
-          <p:cNvCxnSpPr/>
+          <p:cNvCxnSpPr>
+            <a:cxnSpLocks/>
+          </p:cNvCxnSpPr>
           <p:nvPr/>
         </p:nvCxnSpPr>
         <p:spPr>
-          <a:xfrm>
-            <a:off x="2663097" y="2670639"/>
-            <a:ext cx="3061841" cy="0"/>
+          <a:xfrm flipH="1">
+            <a:off x="3330300" y="3581443"/>
+            <a:ext cx="2887058" cy="0"/>
           </a:xfrm>
           <a:prstGeom prst="straightConnector1">
             <a:avLst/>
@@ -5650,8 +5135,8 @@
         </p:nvSpPr>
         <p:spPr>
           <a:xfrm>
-            <a:off x="2730529" y="2395536"/>
-            <a:ext cx="3040455" cy="215444"/>
+            <a:off x="3605449" y="3126899"/>
+            <a:ext cx="3040455" cy="400110"/>
           </a:xfrm>
           <a:prstGeom prst="rect">
             <a:avLst/>
@@ -5665,20 +5150,22 @@
           <a:lstStyle/>
           <a:p>
             <a:r>
-              <a:rPr lang="en-US" sz="1400" dirty="0" err="1">
+              <a:rPr lang="en-US" sz="1300" dirty="0">
                 <a:solidFill>
                   <a:srgbClr val="00B050"/>
                 </a:solidFill>
               </a:rPr>
               <a:t>handleAchievementLevelChangedEvent</a:t>
             </a:r>
-            <a:r>
-              <a:rPr lang="en-US" sz="1400" dirty="0">
+          </a:p>
+          <a:p>
+            <a:r>
+              <a:rPr lang="en-US" sz="1300" dirty="0">
                 <a:solidFill>
                   <a:srgbClr val="00B050"/>
                 </a:solidFill>
               </a:rPr>
-              <a:t>()</a:t>
+              <a:t>(AchievementsUpdatedEvent)</a:t>
             </a:r>
           </a:p>
         </p:txBody>
@@ -5697,10 +5184,10 @@
         </p:nvGrpSpPr>
         <p:grpSpPr>
           <a:xfrm>
-            <a:off x="2342388" y="2612199"/>
-            <a:ext cx="217349" cy="270072"/>
-            <a:chOff x="1028134" y="5612032"/>
-            <a:chExt cx="217349" cy="270072"/>
+            <a:off x="6309000" y="3498799"/>
+            <a:ext cx="390422" cy="535030"/>
+            <a:chOff x="1306972" y="5190726"/>
+            <a:chExt cx="390422" cy="535030"/>
           </a:xfrm>
         </p:grpSpPr>
         <p:sp>
@@ -5716,9 +5203,9 @@
             <p:nvPr/>
           </p:nvSpPr>
           <p:spPr>
-            <a:xfrm rot="2600998" flipH="1" flipV="1">
-              <a:off x="1028134" y="5612032"/>
-              <a:ext cx="167452" cy="116880"/>
+            <a:xfrm rot="8724581" flipH="1">
+              <a:off x="1319459" y="5190726"/>
+              <a:ext cx="377935" cy="237922"/>
             </a:xfrm>
             <a:custGeom>
               <a:avLst/>
@@ -5815,9 +5302,9 @@
             <p:nvPr/>
           </p:nvSpPr>
           <p:spPr>
-            <a:xfrm>
-              <a:off x="1147403" y="5712513"/>
-              <a:ext cx="98080" cy="169591"/>
+            <a:xfrm flipV="1">
+              <a:off x="1306972" y="5444571"/>
+              <a:ext cx="94705" cy="281185"/>
             </a:xfrm>
             <a:prstGeom prst="rect">
               <a:avLst/>
@@ -5874,8 +5361,8 @@
         </p:nvSpPr>
         <p:spPr>
           <a:xfrm>
-            <a:off x="990600" y="2444738"/>
-            <a:ext cx="1312297" cy="430887"/>
+            <a:off x="6749733" y="3152480"/>
+            <a:ext cx="1632267" cy="400110"/>
           </a:xfrm>
           <a:prstGeom prst="rect">
             <a:avLst/>
@@ -5888,18 +5375,296 @@
           </a:bodyPr>
           <a:lstStyle/>
           <a:p>
-            <a:pPr algn="r"/>
-            <a:r>
-              <a:rPr lang="en-US" sz="1400" dirty="0">
+            <a:r>
+              <a:rPr lang="en-US" sz="1300" dirty="0">
                 <a:solidFill>
                   <a:srgbClr val="00B050"/>
                 </a:solidFill>
               </a:rPr>
-              <a:t>Update achievement bar</a:t>
-            </a:r>
-          </a:p>
-        </p:txBody>
-      </p:sp>
+              <a:t>setLabelValues</a:t>
+            </a:r>
+          </a:p>
+          <a:p>
+            <a:r>
+              <a:rPr lang="en-US" sz="1300" dirty="0">
+                <a:solidFill>
+                  <a:srgbClr val="00B050"/>
+                </a:solidFill>
+              </a:rPr>
+              <a:t>(AchievementRecord)</a:t>
+            </a:r>
+          </a:p>
+        </p:txBody>
+      </p:sp>
+      <p:sp>
+        <p:nvSpPr>
+          <p:cNvPr id="18" name="Rectangle 62">
+            <a:extLst>
+              <a:ext uri="{FF2B5EF4-FFF2-40B4-BE49-F238E27FC236}">
+                <a16:creationId xmlns:a16="http://schemas.microsoft.com/office/drawing/2014/main" id="{C07BB94A-BA0B-9649-B941-BED2780039E4}"/>
+              </a:ext>
+            </a:extLst>
+          </p:cNvPr>
+          <p:cNvSpPr/>
+          <p:nvPr/>
+        </p:nvSpPr>
+        <p:spPr>
+          <a:xfrm>
+            <a:off x="2588728" y="2567609"/>
+            <a:ext cx="1371600" cy="346760"/>
+          </a:xfrm>
+          <a:prstGeom prst="rect">
+            <a:avLst/>
+          </a:prstGeom>
+          <a:solidFill>
+            <a:schemeClr val="accent5">
+              <a:lumMod val="75000"/>
+            </a:schemeClr>
+          </a:solidFill>
+          <a:ln w="19050">
+            <a:solidFill>
+              <a:schemeClr val="accent5">
+                <a:lumMod val="75000"/>
+              </a:schemeClr>
+            </a:solidFill>
+          </a:ln>
+          <a:effectLst/>
+        </p:spPr>
+        <p:style>
+          <a:lnRef idx="1">
+            <a:schemeClr val="accent2"/>
+          </a:lnRef>
+          <a:fillRef idx="2">
+            <a:schemeClr val="accent2"/>
+          </a:fillRef>
+          <a:effectRef idx="1">
+            <a:schemeClr val="accent2"/>
+          </a:effectRef>
+          <a:fontRef idx="minor">
+            <a:schemeClr val="dk1"/>
+          </a:fontRef>
+        </p:style>
+        <p:txBody>
+          <a:bodyPr rtlCol="0" anchor="ctr"/>
+          <a:lstStyle/>
+          <a:p>
+            <a:pPr algn="ctr"/>
+            <a:r>
+              <a:rPr lang="en-US" sz="1600" dirty="0">
+                <a:solidFill>
+                  <a:schemeClr val="bg1"/>
+                </a:solidFill>
+              </a:rPr>
+              <a:t>:EventsCenter</a:t>
+            </a:r>
+            <a:endParaRPr lang="en-SG" sz="1600" dirty="0">
+              <a:solidFill>
+                <a:schemeClr val="bg1"/>
+              </a:solidFill>
+            </a:endParaRPr>
+          </a:p>
+        </p:txBody>
+      </p:sp>
+      <p:cxnSp>
+        <p:nvCxnSpPr>
+          <p:cNvPr id="19" name="Straight Connector 18">
+            <a:extLst>
+              <a:ext uri="{FF2B5EF4-FFF2-40B4-BE49-F238E27FC236}">
+                <a16:creationId xmlns:a16="http://schemas.microsoft.com/office/drawing/2014/main" id="{1C21A6FE-B461-3844-A78E-9ED5BA6D3ADE}"/>
+              </a:ext>
+            </a:extLst>
+          </p:cNvPr>
+          <p:cNvCxnSpPr>
+            <a:cxnSpLocks/>
+          </p:cNvCxnSpPr>
+          <p:nvPr/>
+        </p:nvCxnSpPr>
+        <p:spPr>
+          <a:xfrm>
+            <a:off x="3254313" y="2920663"/>
+            <a:ext cx="0" cy="1723059"/>
+          </a:xfrm>
+          <a:prstGeom prst="line">
+            <a:avLst/>
+          </a:prstGeom>
+          <a:ln w="19050">
+            <a:solidFill>
+              <a:schemeClr val="accent5">
+                <a:lumMod val="75000"/>
+              </a:schemeClr>
+            </a:solidFill>
+            <a:prstDash val="sysDash"/>
+          </a:ln>
+          <a:effectLst/>
+        </p:spPr>
+        <p:style>
+          <a:lnRef idx="1">
+            <a:schemeClr val="accent1"/>
+          </a:lnRef>
+          <a:fillRef idx="2">
+            <a:schemeClr val="accent1"/>
+          </a:fillRef>
+          <a:effectRef idx="1">
+            <a:schemeClr val="accent1"/>
+          </a:effectRef>
+          <a:fontRef idx="minor">
+            <a:schemeClr val="dk1"/>
+          </a:fontRef>
+        </p:style>
+      </p:cxnSp>
+      <p:sp>
+        <p:nvSpPr>
+          <p:cNvPr id="20" name="Rectangle 19">
+            <a:extLst>
+              <a:ext uri="{FF2B5EF4-FFF2-40B4-BE49-F238E27FC236}">
+                <a16:creationId xmlns:a16="http://schemas.microsoft.com/office/drawing/2014/main" id="{2B73033E-F391-654F-8751-4F3C47594E9D}"/>
+              </a:ext>
+            </a:extLst>
+          </p:cNvPr>
+          <p:cNvSpPr/>
+          <p:nvPr/>
+        </p:nvSpPr>
+        <p:spPr>
+          <a:xfrm>
+            <a:off x="3182305" y="3343596"/>
+            <a:ext cx="142006" cy="1036757"/>
+          </a:xfrm>
+          <a:prstGeom prst="rect">
+            <a:avLst/>
+          </a:prstGeom>
+          <a:solidFill>
+            <a:schemeClr val="accent5">
+              <a:lumMod val="75000"/>
+            </a:schemeClr>
+          </a:solidFill>
+          <a:ln>
+            <a:solidFill>
+              <a:schemeClr val="accent5">
+                <a:lumMod val="75000"/>
+              </a:schemeClr>
+            </a:solidFill>
+          </a:ln>
+          <a:effectLst/>
+        </p:spPr>
+        <p:style>
+          <a:lnRef idx="1">
+            <a:schemeClr val="accent3"/>
+          </a:lnRef>
+          <a:fillRef idx="2">
+            <a:schemeClr val="accent3"/>
+          </a:fillRef>
+          <a:effectRef idx="1">
+            <a:schemeClr val="accent3"/>
+          </a:effectRef>
+          <a:fontRef idx="minor">
+            <a:schemeClr val="dk1"/>
+          </a:fontRef>
+        </p:style>
+        <p:txBody>
+          <a:bodyPr rtlCol="0" anchor="ctr"/>
+          <a:lstStyle/>
+          <a:p>
+            <a:pPr algn="ctr"/>
+            <a:endParaRPr lang="en-SG" sz="1400">
+              <a:solidFill>
+                <a:schemeClr val="dk1"/>
+              </a:solidFill>
+            </a:endParaRPr>
+          </a:p>
+        </p:txBody>
+      </p:sp>
+      <p:cxnSp>
+        <p:nvCxnSpPr>
+          <p:cNvPr id="21" name="Straight Arrow Connector 20">
+            <a:extLst>
+              <a:ext uri="{FF2B5EF4-FFF2-40B4-BE49-F238E27FC236}">
+                <a16:creationId xmlns:a16="http://schemas.microsoft.com/office/drawing/2014/main" id="{22C8B966-0566-5D4D-93F7-E30F5B7C17EF}"/>
+              </a:ext>
+            </a:extLst>
+          </p:cNvPr>
+          <p:cNvCxnSpPr>
+            <a:cxnSpLocks/>
+          </p:cNvCxnSpPr>
+          <p:nvPr/>
+        </p:nvCxnSpPr>
+        <p:spPr>
+          <a:xfrm>
+            <a:off x="1876511" y="3343596"/>
+            <a:ext cx="1295400" cy="0"/>
+          </a:xfrm>
+          <a:prstGeom prst="straightConnector1">
+            <a:avLst/>
+          </a:prstGeom>
+          <a:ln w="19050">
+            <a:solidFill>
+              <a:srgbClr val="7030A0"/>
+            </a:solidFill>
+            <a:tailEnd type="arrow"/>
+          </a:ln>
+        </p:spPr>
+        <p:style>
+          <a:lnRef idx="1">
+            <a:schemeClr val="accent1"/>
+          </a:lnRef>
+          <a:fillRef idx="0">
+            <a:schemeClr val="accent1"/>
+          </a:fillRef>
+          <a:effectRef idx="0">
+            <a:schemeClr val="accent1"/>
+          </a:effectRef>
+          <a:fontRef idx="minor">
+            <a:schemeClr val="tx1"/>
+          </a:fontRef>
+        </p:style>
+      </p:cxnSp>
+      <p:cxnSp>
+        <p:nvCxnSpPr>
+          <p:cNvPr id="22" name="Straight Arrow Connector 21">
+            <a:extLst>
+              <a:ext uri="{FF2B5EF4-FFF2-40B4-BE49-F238E27FC236}">
+                <a16:creationId xmlns:a16="http://schemas.microsoft.com/office/drawing/2014/main" id="{8E3D64EA-51B7-E842-9A38-FC446CF2376D}"/>
+              </a:ext>
+            </a:extLst>
+          </p:cNvPr>
+          <p:cNvCxnSpPr>
+            <a:cxnSpLocks/>
+          </p:cNvCxnSpPr>
+          <p:nvPr/>
+        </p:nvCxnSpPr>
+        <p:spPr>
+          <a:xfrm>
+            <a:off x="1773224" y="4380353"/>
+            <a:ext cx="1448755" cy="0"/>
+          </a:xfrm>
+          <a:prstGeom prst="straightConnector1">
+            <a:avLst/>
+          </a:prstGeom>
+          <a:ln w="19050">
+            <a:solidFill>
+              <a:schemeClr val="accent5">
+                <a:lumMod val="75000"/>
+              </a:schemeClr>
+            </a:solidFill>
+            <a:prstDash val="sysDash"/>
+            <a:headEnd type="arrow" w="med" len="med"/>
+            <a:tailEnd type="none" w="med" len="med"/>
+          </a:ln>
+        </p:spPr>
+        <p:style>
+          <a:lnRef idx="1">
+            <a:schemeClr val="accent1"/>
+          </a:lnRef>
+          <a:fillRef idx="0">
+            <a:schemeClr val="accent1"/>
+          </a:fillRef>
+          <a:effectRef idx="0">
+            <a:schemeClr val="accent1"/>
+          </a:effectRef>
+          <a:fontRef idx="minor">
+            <a:schemeClr val="tx1"/>
+          </a:fontRef>
+        </p:style>
+      </p:cxnSp>
     </p:spTree>
     <p:extLst>
       <p:ext uri="{BB962C8B-B14F-4D97-AF65-F5344CB8AC3E}">
@@ -5944,8 +5709,8 @@
         </p:nvSpPr>
         <p:spPr>
           <a:xfrm>
-            <a:off x="153571" y="1994311"/>
-            <a:ext cx="235669" cy="235669"/>
+            <a:off x="4543112" y="33131"/>
+            <a:ext cx="239268" cy="227185"/>
           </a:xfrm>
           <a:prstGeom prst="ellipse">
             <a:avLst/>
@@ -5990,14 +5755,14 @@
           </p:cNvPr>
           <p:cNvCxnSpPr>
             <a:cxnSpLocks/>
-            <a:stCxn id="4" idx="6"/>
+            <a:stCxn id="2" idx="4"/>
           </p:cNvCxnSpPr>
           <p:nvPr/>
         </p:nvCxnSpPr>
         <p:spPr>
           <a:xfrm>
-            <a:off x="389240" y="2112146"/>
-            <a:ext cx="227605" cy="839"/>
+            <a:off x="4662746" y="260316"/>
+            <a:ext cx="0" cy="163377"/>
           </a:xfrm>
           <a:prstGeom prst="straightConnector1">
             <a:avLst/>
@@ -6035,8 +5800,8 @@
         </p:nvSpPr>
         <p:spPr>
           <a:xfrm>
-            <a:off x="616845" y="1754766"/>
-            <a:ext cx="1570355" cy="716437"/>
+            <a:off x="3865577" y="423693"/>
+            <a:ext cx="1594334" cy="690645"/>
           </a:xfrm>
           <a:prstGeom prst="roundRect">
             <a:avLst/>
@@ -6089,8 +5854,8 @@
         </p:nvCxnSpPr>
         <p:spPr>
           <a:xfrm>
-            <a:off x="2187200" y="2104029"/>
-            <a:ext cx="158964" cy="0"/>
+            <a:off x="4662742" y="1114338"/>
+            <a:ext cx="0" cy="208021"/>
           </a:xfrm>
           <a:prstGeom prst="straightConnector1">
             <a:avLst/>
@@ -6116,10 +5881,10 @@
       </p:cxnSp>
       <p:sp>
         <p:nvSpPr>
-          <p:cNvPr id="6" name="Diamond 5">
-            <a:extLst>
-              <a:ext uri="{FF2B5EF4-FFF2-40B4-BE49-F238E27FC236}">
-                <a16:creationId xmlns:a16="http://schemas.microsoft.com/office/drawing/2014/main" id="{9011FDAC-70ED-2243-AD4F-E11D40DA7495}"/>
+          <p:cNvPr id="9" name="Rectangle: Rounded Corners 50">
+            <a:extLst>
+              <a:ext uri="{FF2B5EF4-FFF2-40B4-BE49-F238E27FC236}">
+                <a16:creationId xmlns:a16="http://schemas.microsoft.com/office/drawing/2014/main" id="{EA36966B-7A15-4F4A-A19B-97B46D879C8E}"/>
               </a:ext>
             </a:extLst>
           </p:cNvPr>
@@ -6128,40 +5893,23 @@
         </p:nvSpPr>
         <p:spPr>
           <a:xfrm>
-            <a:off x="7592127" y="4446997"/>
-            <a:ext cx="480766" cy="480766"/>
-          </a:xfrm>
-          <a:prstGeom prst="diamond">
-            <a:avLst/>
-          </a:prstGeom>
-          <a:gradFill>
-            <a:gsLst>
-              <a:gs pos="0">
-                <a:srgbClr val="7030A0"/>
-              </a:gs>
-              <a:gs pos="35000">
-                <a:srgbClr val="7030A0"/>
-              </a:gs>
-              <a:gs pos="99000">
-                <a:schemeClr val="bg1"/>
-              </a:gs>
-            </a:gsLst>
-          </a:gradFill>
-          <a:ln>
-            <a:solidFill>
-              <a:srgbClr val="7030A0"/>
-            </a:solidFill>
-          </a:ln>
+            <a:off x="1300832" y="4236305"/>
+            <a:ext cx="2627170" cy="785331"/>
+          </a:xfrm>
+          <a:prstGeom prst="roundRect">
+            <a:avLst/>
+          </a:prstGeom>
+          <a:ln/>
         </p:spPr>
         <p:style>
           <a:lnRef idx="1">
-            <a:schemeClr val="accent6"/>
+            <a:schemeClr val="accent4"/>
           </a:lnRef>
           <a:fillRef idx="2">
-            <a:schemeClr val="accent6"/>
+            <a:schemeClr val="accent4"/>
           </a:fillRef>
           <a:effectRef idx="1">
-            <a:schemeClr val="accent6"/>
+            <a:schemeClr val="accent4"/>
           </a:effectRef>
           <a:fontRef idx="minor">
             <a:schemeClr val="dk1"/>
@@ -6177,51 +5925,31 @@
           <a:lstStyle/>
           <a:p>
             <a:pPr algn="ctr"/>
-            <a:endParaRPr lang="en-SG" sz="1801"/>
-          </a:p>
-        </p:txBody>
-      </p:sp>
-      <p:sp>
-        <p:nvSpPr>
-          <p:cNvPr id="7" name="TextBox 6">
-            <a:extLst>
-              <a:ext uri="{FF2B5EF4-FFF2-40B4-BE49-F238E27FC236}">
-                <a16:creationId xmlns:a16="http://schemas.microsoft.com/office/drawing/2014/main" id="{06A41DDC-F781-0A43-960E-951B73587B0F}"/>
-              </a:ext>
-            </a:extLst>
-          </p:cNvPr>
-          <p:cNvSpPr txBox="1"/>
-          <p:nvPr/>
-        </p:nvSpPr>
-        <p:spPr>
-          <a:xfrm>
-            <a:off x="3446281" y="5042986"/>
-            <a:ext cx="853127" cy="276999"/>
-          </a:xfrm>
-          <a:prstGeom prst="rect">
-            <a:avLst/>
-          </a:prstGeom>
-          <a:noFill/>
-        </p:spPr>
-        <p:txBody>
-          <a:bodyPr wrap="square" rtlCol="0">
-            <a:spAutoFit/>
-          </a:bodyPr>
-          <a:lstStyle/>
-          <a:p>
-            <a:r>
-              <a:rPr lang="en-SG" sz="1200" dirty="0"/>
-              <a:t>[else]</a:t>
-            </a:r>
-          </a:p>
-        </p:txBody>
-      </p:sp>
-      <p:sp>
-        <p:nvSpPr>
-          <p:cNvPr id="9" name="Rectangle: Rounded Corners 50">
-            <a:extLst>
-              <a:ext uri="{FF2B5EF4-FFF2-40B4-BE49-F238E27FC236}">
-                <a16:creationId xmlns:a16="http://schemas.microsoft.com/office/drawing/2014/main" id="{EA36966B-7A15-4F4A-A19B-97B46D879C8E}"/>
+            <a:r>
+              <a:rPr lang="en-SG" sz="1400" dirty="0"/>
+              <a:t>Reset time time-based fields and </a:t>
+            </a:r>
+            <a:r>
+              <a:rPr lang="en-SG" sz="1400" dirty="0" err="1"/>
+              <a:t>nextDayBreakPoint</a:t>
+            </a:r>
+            <a:endParaRPr lang="en-SG" sz="1400" dirty="0"/>
+          </a:p>
+          <a:p>
+            <a:pPr algn="ctr"/>
+            <a:r>
+              <a:rPr lang="en-SG" sz="1400" dirty="0"/>
+              <a:t>to next day</a:t>
+            </a:r>
+          </a:p>
+        </p:txBody>
+      </p:sp>
+      <p:sp>
+        <p:nvSpPr>
+          <p:cNvPr id="6" name="Diamond 5">
+            <a:extLst>
+              <a:ext uri="{FF2B5EF4-FFF2-40B4-BE49-F238E27FC236}">
+                <a16:creationId xmlns:a16="http://schemas.microsoft.com/office/drawing/2014/main" id="{9011FDAC-70ED-2243-AD4F-E11D40DA7495}"/>
               </a:ext>
             </a:extLst>
           </p:cNvPr>
@@ -6229,41 +5957,24 @@
           <p:nvPr/>
         </p:nvSpPr>
         <p:spPr>
-          <a:xfrm>
-            <a:off x="4419600" y="3810000"/>
-            <a:ext cx="2953232" cy="814659"/>
-          </a:xfrm>
-          <a:prstGeom prst="roundRect">
-            <a:avLst/>
-          </a:prstGeom>
-          <a:gradFill>
-            <a:gsLst>
-              <a:gs pos="0">
-                <a:srgbClr val="7030A0"/>
-              </a:gs>
-              <a:gs pos="34000">
-                <a:srgbClr val="7030A0"/>
-              </a:gs>
-              <a:gs pos="100000">
-                <a:schemeClr val="bg1"/>
-              </a:gs>
-            </a:gsLst>
-          </a:gradFill>
-          <a:ln>
-            <a:solidFill>
-              <a:srgbClr val="7030A0"/>
-            </a:solidFill>
-          </a:ln>
+          <a:xfrm rot="16200000" flipH="1">
+            <a:off x="4602856" y="5662795"/>
+            <a:ext cx="463458" cy="488107"/>
+          </a:xfrm>
+          <a:prstGeom prst="diamond">
+            <a:avLst/>
+          </a:prstGeom>
+          <a:ln/>
         </p:spPr>
         <p:style>
           <a:lnRef idx="1">
-            <a:schemeClr val="accent6"/>
+            <a:schemeClr val="accent4"/>
           </a:lnRef>
           <a:fillRef idx="2">
-            <a:schemeClr val="accent6"/>
+            <a:schemeClr val="accent4"/>
           </a:fillRef>
           <a:effectRef idx="1">
-            <a:schemeClr val="accent6"/>
+            <a:schemeClr val="accent4"/>
           </a:effectRef>
           <a:fontRef idx="minor">
             <a:schemeClr val="dk1"/>
@@ -6279,13 +5990,41 @@
           <a:lstStyle/>
           <a:p>
             <a:pPr algn="ctr"/>
-            <a:r>
-              <a:rPr lang="en-SG" sz="1600" dirty="0" err="1"/>
-              <a:t>AchievementRecord</a:t>
-            </a:r>
-            <a:r>
-              <a:rPr lang="en-SG" sz="1600" dirty="0"/>
-              <a:t> updates to new Level</a:t>
+            <a:endParaRPr lang="en-SG" sz="1801"/>
+          </a:p>
+        </p:txBody>
+      </p:sp>
+      <p:sp>
+        <p:nvSpPr>
+          <p:cNvPr id="7" name="TextBox 6">
+            <a:extLst>
+              <a:ext uri="{FF2B5EF4-FFF2-40B4-BE49-F238E27FC236}">
+                <a16:creationId xmlns:a16="http://schemas.microsoft.com/office/drawing/2014/main" id="{06A41DDC-F781-0A43-960E-951B73587B0F}"/>
+              </a:ext>
+            </a:extLst>
+          </p:cNvPr>
+          <p:cNvSpPr txBox="1"/>
+          <p:nvPr/>
+        </p:nvSpPr>
+        <p:spPr>
+          <a:xfrm flipH="1">
+            <a:off x="6477000" y="3446050"/>
+            <a:ext cx="866154" cy="267027"/>
+          </a:xfrm>
+          <a:prstGeom prst="rect">
+            <a:avLst/>
+          </a:prstGeom>
+          <a:noFill/>
+        </p:spPr>
+        <p:txBody>
+          <a:bodyPr wrap="square" rtlCol="0">
+            <a:spAutoFit/>
+          </a:bodyPr>
+          <a:lstStyle/>
+          <a:p>
+            <a:r>
+              <a:rPr lang="en-SG" sz="1200" dirty="0"/>
+              <a:t>[else]</a:t>
             </a:r>
           </a:p>
         </p:txBody>
@@ -6303,41 +6042,24 @@
           <p:nvPr/>
         </p:nvSpPr>
         <p:spPr>
-          <a:xfrm>
-            <a:off x="3698450" y="4444047"/>
-            <a:ext cx="480766" cy="480766"/>
+          <a:xfrm rot="16200000" flipH="1">
+            <a:off x="4437481" y="3443977"/>
+            <a:ext cx="463458" cy="488107"/>
           </a:xfrm>
           <a:prstGeom prst="diamond">
             <a:avLst/>
           </a:prstGeom>
-          <a:gradFill>
-            <a:gsLst>
-              <a:gs pos="0">
-                <a:srgbClr val="7030A0"/>
-              </a:gs>
-              <a:gs pos="35000">
-                <a:srgbClr val="7030A0"/>
-              </a:gs>
-              <a:gs pos="99000">
-                <a:schemeClr val="bg1"/>
-              </a:gs>
-            </a:gsLst>
-          </a:gradFill>
-          <a:ln>
-            <a:solidFill>
-              <a:srgbClr val="7030A0"/>
-            </a:solidFill>
-          </a:ln>
+          <a:ln/>
         </p:spPr>
         <p:style>
           <a:lnRef idx="1">
-            <a:schemeClr val="accent6"/>
+            <a:schemeClr val="accent4"/>
           </a:lnRef>
           <a:fillRef idx="2">
-            <a:schemeClr val="accent6"/>
+            <a:schemeClr val="accent4"/>
           </a:fillRef>
           <a:effectRef idx="1">
-            <a:schemeClr val="accent6"/>
+            <a:schemeClr val="accent4"/>
           </a:effectRef>
           <a:fontRef idx="minor">
             <a:schemeClr val="dk1"/>
@@ -6368,13 +6090,15 @@
           </p:cNvPr>
           <p:cNvCxnSpPr>
             <a:cxnSpLocks/>
+            <a:stCxn id="6" idx="3"/>
+            <a:endCxn id="13" idx="2"/>
           </p:cNvCxnSpPr>
           <p:nvPr/>
         </p:nvCxnSpPr>
         <p:spPr>
           <a:xfrm>
-            <a:off x="8072893" y="4687380"/>
-            <a:ext cx="419377" cy="7529"/>
+            <a:off x="4834585" y="6138578"/>
+            <a:ext cx="0" cy="263639"/>
           </a:xfrm>
           <a:prstGeom prst="straightConnector1">
             <a:avLst/>
@@ -6411,9 +6135,9 @@
           <p:nvPr/>
         </p:nvGrpSpPr>
         <p:grpSpPr>
-          <a:xfrm>
-            <a:off x="8518518" y="4566595"/>
-            <a:ext cx="235669" cy="235669"/>
+          <a:xfrm rot="16200000" flipH="1">
+            <a:off x="4720992" y="6396175"/>
+            <a:ext cx="227185" cy="239268"/>
             <a:chOff x="8040730" y="5082186"/>
             <a:chExt cx="235669" cy="235669"/>
           </a:xfrm>
@@ -6529,13 +6253,15 @@
               </a:ext>
             </a:extLst>
           </p:cNvPr>
-          <p:cNvCxnSpPr/>
+          <p:cNvCxnSpPr>
+            <a:cxnSpLocks/>
+          </p:cNvCxnSpPr>
           <p:nvPr/>
         </p:nvCxnSpPr>
         <p:spPr>
-          <a:xfrm rot="5400000" flipH="1" flipV="1">
-            <a:off x="4065030" y="4088184"/>
-            <a:ext cx="229667" cy="482060"/>
+          <a:xfrm rot="10800000" flipV="1">
+            <a:off x="5604784" y="2513167"/>
+            <a:ext cx="233174" cy="464706"/>
           </a:xfrm>
           <a:prstGeom prst="bentConnector2">
             <a:avLst/>
@@ -6568,17 +6294,21 @@
               </a:ext>
             </a:extLst>
           </p:cNvPr>
-          <p:cNvCxnSpPr/>
+          <p:cNvCxnSpPr>
+            <a:cxnSpLocks/>
+            <a:stCxn id="10" idx="2"/>
+            <a:endCxn id="6" idx="2"/>
+          </p:cNvCxnSpPr>
           <p:nvPr/>
         </p:nvCxnSpPr>
         <p:spPr>
-          <a:xfrm rot="16200000" flipH="1">
-            <a:off x="5884196" y="2979449"/>
-            <a:ext cx="2950" cy="3893677"/>
+          <a:xfrm>
+            <a:off x="4913264" y="3688030"/>
+            <a:ext cx="165374" cy="2218818"/>
           </a:xfrm>
           <a:prstGeom prst="bentConnector3">
             <a:avLst>
-              <a:gd name="adj1" fmla="val 7849153"/>
+              <a:gd name="adj1" fmla="val 1187461"/>
             </a:avLst>
           </a:prstGeom>
           <a:ln>
@@ -6609,13 +6339,17 @@
               </a:ext>
             </a:extLst>
           </p:cNvPr>
-          <p:cNvCxnSpPr/>
+          <p:cNvCxnSpPr>
+            <a:cxnSpLocks/>
+            <a:stCxn id="9" idx="2"/>
+            <a:endCxn id="6" idx="0"/>
+          </p:cNvCxnSpPr>
           <p:nvPr/>
         </p:nvCxnSpPr>
         <p:spPr>
-          <a:xfrm>
-            <a:off x="7372832" y="4217330"/>
-            <a:ext cx="459678" cy="229667"/>
+          <a:xfrm rot="16200000" flipH="1">
+            <a:off x="3159868" y="4476184"/>
+            <a:ext cx="885213" cy="1976115"/>
           </a:xfrm>
           <a:prstGeom prst="bentConnector2">
             <a:avLst/>
@@ -6653,43 +6387,23 @@
         </p:nvSpPr>
         <p:spPr>
           <a:xfrm>
-            <a:off x="2350122" y="1754766"/>
-            <a:ext cx="1411911" cy="716437"/>
+            <a:off x="3745282" y="1339259"/>
+            <a:ext cx="1834920" cy="690645"/>
           </a:xfrm>
           <a:prstGeom prst="roundRect">
             <a:avLst/>
           </a:prstGeom>
-          <a:gradFill>
-            <a:gsLst>
-              <a:gs pos="100000">
-                <a:srgbClr val="7030A0"/>
-              </a:gs>
-              <a:gs pos="0">
-                <a:srgbClr val="7030A0"/>
-              </a:gs>
-              <a:gs pos="100000">
-                <a:schemeClr val="bg1"/>
-              </a:gs>
-              <a:gs pos="99000">
-                <a:schemeClr val="bg1"/>
-              </a:gs>
-            </a:gsLst>
-          </a:gradFill>
-          <a:ln>
-            <a:solidFill>
-              <a:srgbClr val="7030A0"/>
-            </a:solidFill>
-          </a:ln>
+          <a:ln/>
         </p:spPr>
         <p:style>
           <a:lnRef idx="1">
-            <a:schemeClr val="accent5"/>
+            <a:schemeClr val="accent4"/>
           </a:lnRef>
           <a:fillRef idx="2">
-            <a:schemeClr val="accent5"/>
+            <a:schemeClr val="accent4"/>
           </a:fillRef>
           <a:effectRef idx="1">
-            <a:schemeClr val="accent5"/>
+            <a:schemeClr val="accent4"/>
           </a:effectRef>
           <a:fontRef idx="minor">
             <a:schemeClr val="dk1"/>
@@ -6706,18 +6420,25 @@
           <a:p>
             <a:pPr algn="ctr"/>
             <a:r>
+              <a:rPr lang="en-SG" sz="1400" dirty="0"/>
+              <a:t>New </a:t>
+            </a:r>
+            <a:r>
+              <a:rPr lang="en-SG" sz="1400" dirty="0" err="1"/>
+              <a:t>xp</a:t>
+            </a:r>
+            <a:r>
+              <a:rPr lang="en-SG" sz="1400" dirty="0"/>
+              <a:t> added to </a:t>
+            </a:r>
+            <a:r>
               <a:rPr lang="en-SG" sz="1400" dirty="0" err="1"/>
               <a:t>AchievementRecord</a:t>
             </a:r>
             <a:r>
               <a:rPr lang="en-SG" sz="1400" dirty="0"/>
-              <a:t> updates to new </a:t>
-            </a:r>
-            <a:r>
-              <a:rPr lang="en-SG" sz="1400" dirty="0" err="1"/>
-              <a:t>Xp</a:t>
-            </a:r>
-            <a:endParaRPr lang="en-SG" sz="1400" dirty="0"/>
+              <a:t> </a:t>
+            </a:r>
           </a:p>
         </p:txBody>
       </p:sp>
@@ -6732,13 +6453,14 @@
           </p:cNvPr>
           <p:cNvCxnSpPr>
             <a:cxnSpLocks/>
+            <a:stCxn id="24" idx="2"/>
           </p:cNvCxnSpPr>
           <p:nvPr/>
         </p:nvCxnSpPr>
         <p:spPr>
           <a:xfrm>
-            <a:off x="3779868" y="2124138"/>
-            <a:ext cx="158964" cy="0"/>
+            <a:off x="4662742" y="2029904"/>
+            <a:ext cx="0" cy="224921"/>
           </a:xfrm>
           <a:prstGeom prst="straightConnector1">
             <a:avLst/>
@@ -6776,43 +6498,23 @@
         </p:nvSpPr>
         <p:spPr>
           <a:xfrm>
-            <a:off x="3951681" y="1753926"/>
-            <a:ext cx="2144319" cy="716437"/>
+            <a:off x="3426520" y="2242750"/>
+            <a:ext cx="2472444" cy="690645"/>
           </a:xfrm>
           <a:prstGeom prst="roundRect">
             <a:avLst/>
           </a:prstGeom>
-          <a:gradFill>
-            <a:gsLst>
-              <a:gs pos="100000">
-                <a:srgbClr val="7030A0"/>
-              </a:gs>
-              <a:gs pos="0">
-                <a:srgbClr val="7030A0"/>
-              </a:gs>
-              <a:gs pos="100000">
-                <a:schemeClr val="bg1"/>
-              </a:gs>
-              <a:gs pos="99000">
-                <a:schemeClr val="bg1"/>
-              </a:gs>
-            </a:gsLst>
-          </a:gradFill>
-          <a:ln>
-            <a:solidFill>
-              <a:srgbClr val="7030A0"/>
-            </a:solidFill>
-          </a:ln>
+          <a:ln/>
         </p:spPr>
         <p:style>
           <a:lnRef idx="1">
-            <a:schemeClr val="accent5"/>
+            <a:schemeClr val="accent4"/>
           </a:lnRef>
           <a:fillRef idx="2">
-            <a:schemeClr val="accent5"/>
+            <a:schemeClr val="accent4"/>
           </a:fillRef>
           <a:effectRef idx="1">
-            <a:schemeClr val="accent5"/>
+            <a:schemeClr val="accent4"/>
           </a:effectRef>
           <a:fontRef idx="minor">
             <a:schemeClr val="dk1"/>
@@ -6834,16 +6536,13 @@
             </a:r>
             <a:r>
               <a:rPr lang="en-SG" sz="1400" dirty="0"/>
-              <a:t> checks for matching level according to </a:t>
+              <a:t> checks current date against </a:t>
             </a:r>
             <a:r>
               <a:rPr lang="en-SG" sz="1400" dirty="0" err="1"/>
-              <a:t>xp</a:t>
-            </a:r>
-            <a:r>
-              <a:rPr lang="en-SG" sz="1400" dirty="0"/>
-              <a:t> value</a:t>
-            </a:r>
+              <a:t>nextDayBreakPoint</a:t>
+            </a:r>
+            <a:endParaRPr lang="en-SG" sz="1400" dirty="0"/>
           </a:p>
         </p:txBody>
       </p:sp>
@@ -6861,8 +6560,8 @@
         </p:nvSpPr>
         <p:spPr>
           <a:xfrm>
-            <a:off x="2767395" y="3889939"/>
-            <a:ext cx="1532013" cy="461665"/>
+            <a:off x="2553110" y="3265610"/>
+            <a:ext cx="1951717" cy="445045"/>
           </a:xfrm>
           <a:prstGeom prst="rect">
             <a:avLst/>
@@ -6877,38 +6576,85 @@
           <a:p>
             <a:r>
               <a:rPr lang="en-US" sz="1200" dirty="0"/>
-              <a:t>[matching level same as current level]</a:t>
+              <a:t>[current date has passed </a:t>
+            </a:r>
+            <a:r>
+              <a:rPr lang="en-US" sz="1200" dirty="0" err="1"/>
+              <a:t>nextDayBreakPoint</a:t>
+            </a:r>
+            <a:r>
+              <a:rPr lang="en-US" sz="1200" dirty="0"/>
+              <a:t>]</a:t>
             </a:r>
           </a:p>
         </p:txBody>
       </p:sp>
       <p:cxnSp>
         <p:nvCxnSpPr>
-          <p:cNvPr id="36" name="Elbow Connector 35">
-            <a:extLst>
-              <a:ext uri="{FF2B5EF4-FFF2-40B4-BE49-F238E27FC236}">
-                <a16:creationId xmlns:a16="http://schemas.microsoft.com/office/drawing/2014/main" id="{584F9D58-7AA1-4549-9F29-356360BE668E}"/>
+          <p:cNvPr id="35" name="Straight Arrow Connector 34">
+            <a:extLst>
+              <a:ext uri="{FF2B5EF4-FFF2-40B4-BE49-F238E27FC236}">
+                <a16:creationId xmlns:a16="http://schemas.microsoft.com/office/drawing/2014/main" id="{71830C37-BC85-4D4C-B08D-EB7933AA5A22}"/>
               </a:ext>
             </a:extLst>
           </p:cNvPr>
           <p:cNvCxnSpPr>
             <a:cxnSpLocks/>
-            <a:stCxn id="30" idx="3"/>
+            <a:stCxn id="30" idx="2"/>
             <a:endCxn id="10" idx="1"/>
           </p:cNvCxnSpPr>
           <p:nvPr/>
         </p:nvCxnSpPr>
         <p:spPr>
-          <a:xfrm flipH="1">
-            <a:off x="3698450" y="2112145"/>
-            <a:ext cx="2397550" cy="2572285"/>
-          </a:xfrm>
-          <a:prstGeom prst="bentConnector5">
-            <a:avLst>
-              <a:gd name="adj1" fmla="val -9535"/>
-              <a:gd name="adj2" fmla="val 52290"/>
-              <a:gd name="adj3" fmla="val 109535"/>
-            </a:avLst>
+          <a:xfrm>
+            <a:off x="4662742" y="2933395"/>
+            <a:ext cx="6468" cy="522906"/>
+          </a:xfrm>
+          <a:prstGeom prst="straightConnector1">
+            <a:avLst/>
+          </a:prstGeom>
+          <a:ln>
+            <a:tailEnd type="triangle"/>
+          </a:ln>
+        </p:spPr>
+        <p:style>
+          <a:lnRef idx="1">
+            <a:schemeClr val="dk1"/>
+          </a:lnRef>
+          <a:fillRef idx="0">
+            <a:schemeClr val="dk1"/>
+          </a:fillRef>
+          <a:effectRef idx="0">
+            <a:schemeClr val="dk1"/>
+          </a:effectRef>
+          <a:fontRef idx="minor">
+            <a:schemeClr val="tx1"/>
+          </a:fontRef>
+        </p:style>
+      </p:cxnSp>
+      <p:cxnSp>
+        <p:nvCxnSpPr>
+          <p:cNvPr id="59" name="Elbow Connector 58">
+            <a:extLst>
+              <a:ext uri="{FF2B5EF4-FFF2-40B4-BE49-F238E27FC236}">
+                <a16:creationId xmlns:a16="http://schemas.microsoft.com/office/drawing/2014/main" id="{8F06184D-36C5-4F4F-99F1-9AB2B6B71AFE}"/>
+              </a:ext>
+            </a:extLst>
+          </p:cNvPr>
+          <p:cNvCxnSpPr>
+            <a:cxnSpLocks/>
+            <a:stCxn id="10" idx="0"/>
+            <a:endCxn id="9" idx="0"/>
+          </p:cNvCxnSpPr>
+          <p:nvPr/>
+        </p:nvCxnSpPr>
+        <p:spPr>
+          <a:xfrm rot="10800000" flipV="1">
+            <a:off x="2614417" y="3688031"/>
+            <a:ext cx="1810740" cy="548274"/>
+          </a:xfrm>
+          <a:prstGeom prst="bentConnector2">
+            <a:avLst/>
           </a:prstGeom>
           <a:ln>
             <a:solidFill>
@@ -6976,8 +6722,8 @@
         </p:nvSpPr>
         <p:spPr>
           <a:xfrm>
-            <a:off x="1119865" y="1600200"/>
-            <a:ext cx="7947935" cy="3124200"/>
+            <a:off x="609600" y="1524000"/>
+            <a:ext cx="8382000" cy="3200400"/>
           </a:xfrm>
           <a:prstGeom prst="roundRect">
             <a:avLst>
@@ -7043,7 +6789,7 @@
         </p:nvSpPr>
         <p:spPr>
           <a:xfrm>
-            <a:off x="2877180" y="3463240"/>
+            <a:off x="2347552" y="3461271"/>
             <a:ext cx="1093635" cy="346760"/>
           </a:xfrm>
           <a:prstGeom prst="rect">
@@ -7108,7 +6854,7 @@
         </p:nvSpPr>
         <p:spPr>
           <a:xfrm rot="16200000">
-            <a:off x="1661548" y="3097750"/>
+            <a:off x="1131920" y="3095781"/>
             <a:ext cx="1093635" cy="346760"/>
           </a:xfrm>
           <a:prstGeom prst="rect">
@@ -7176,7 +6922,7 @@
         </p:nvCxnSpPr>
         <p:spPr>
           <a:xfrm rot="5400000" flipH="1" flipV="1">
-            <a:off x="4131507" y="1281685"/>
+            <a:off x="3601879" y="1279716"/>
             <a:ext cx="613122" cy="4459404"/>
           </a:xfrm>
           <a:prstGeom prst="bentConnector3">
@@ -7223,7 +6969,7 @@
         </p:nvSpPr>
         <p:spPr>
           <a:xfrm rot="16200000">
-            <a:off x="956202" y="2861202"/>
+            <a:off x="426574" y="2859233"/>
             <a:ext cx="1093635" cy="346760"/>
           </a:xfrm>
           <a:prstGeom prst="rect">
@@ -7299,7 +7045,7 @@
         </p:nvSpPr>
         <p:spPr>
           <a:xfrm rot="16200000">
-            <a:off x="1626910" y="2952291"/>
+            <a:off x="1097282" y="2950322"/>
             <a:ext cx="270504" cy="175523"/>
           </a:xfrm>
           <a:prstGeom prst="triangle">
@@ -7352,7 +7098,7 @@
         </p:nvCxnSpPr>
         <p:spPr>
           <a:xfrm>
-            <a:off x="910091" y="3040053"/>
+            <a:off x="380463" y="3038084"/>
             <a:ext cx="419548" cy="2860"/>
           </a:xfrm>
           <a:prstGeom prst="bentConnector3">
@@ -7401,7 +7147,7 @@
         </p:nvCxnSpPr>
         <p:spPr>
           <a:xfrm flipV="1">
-            <a:off x="1849924" y="3040052"/>
+            <a:off x="1320296" y="3038083"/>
             <a:ext cx="216105" cy="1"/>
           </a:xfrm>
           <a:prstGeom prst="line">
@@ -7446,7 +7192,7 @@
         </p:nvSpPr>
         <p:spPr>
           <a:xfrm>
-            <a:off x="2373780" y="3549930"/>
+            <a:off x="1844152" y="3547961"/>
             <a:ext cx="236048" cy="173380"/>
           </a:xfrm>
           <a:prstGeom prst="flowChartDecision">
@@ -7497,7 +7243,7 @@
         </p:nvSpPr>
         <p:spPr>
           <a:xfrm>
-            <a:off x="2825280" y="2846162"/>
+            <a:off x="2295652" y="2844193"/>
             <a:ext cx="1490560" cy="334856"/>
           </a:xfrm>
           <a:prstGeom prst="rect">
@@ -7530,7 +7276,7 @@
           <a:p>
             <a:pPr algn="ctr"/>
             <a:r>
-              <a:rPr lang="en-US" sz="1050" dirty="0" err="1">
+              <a:rPr lang="en-US" sz="1050" dirty="0">
                 <a:solidFill>
                   <a:srgbClr val="7030A0"/>
                 </a:solidFill>
@@ -7561,7 +7307,7 @@
         </p:nvCxnSpPr>
         <p:spPr>
           <a:xfrm>
-            <a:off x="2624360" y="3003033"/>
+            <a:off x="2094732" y="3001064"/>
             <a:ext cx="200920" cy="10557"/>
           </a:xfrm>
           <a:prstGeom prst="straightConnector1">
@@ -7605,7 +7351,7 @@
         </p:nvSpPr>
         <p:spPr>
           <a:xfrm>
-            <a:off x="2388312" y="2916343"/>
+            <a:off x="1858684" y="2914374"/>
             <a:ext cx="236048" cy="173380"/>
           </a:xfrm>
           <a:prstGeom prst="flowChartDecision">
@@ -7656,7 +7402,7 @@
         </p:nvSpPr>
         <p:spPr>
           <a:xfrm>
-            <a:off x="4692650" y="2846162"/>
+            <a:off x="4163022" y="2844193"/>
             <a:ext cx="1156969" cy="346760"/>
           </a:xfrm>
           <a:prstGeom prst="rect">
@@ -7718,7 +7464,7 @@
         </p:nvSpPr>
         <p:spPr>
           <a:xfrm>
-            <a:off x="4313097" y="2988920"/>
+            <a:off x="3783469" y="2986951"/>
             <a:ext cx="236048" cy="173380"/>
           </a:xfrm>
           <a:prstGeom prst="flowChartDecision">
@@ -7771,7 +7517,7 @@
         </p:nvSpPr>
         <p:spPr>
           <a:xfrm>
-            <a:off x="6313677" y="2858066"/>
+            <a:off x="5784049" y="2856097"/>
             <a:ext cx="708186" cy="346760"/>
           </a:xfrm>
           <a:prstGeom prst="rect">
@@ -7833,7 +7579,7 @@
         </p:nvSpPr>
         <p:spPr>
           <a:xfrm>
-            <a:off x="5858751" y="2941676"/>
+            <a:off x="5329123" y="2939707"/>
             <a:ext cx="236048" cy="173380"/>
           </a:xfrm>
           <a:prstGeom prst="flowChartDecision">
@@ -7884,7 +7630,7 @@
         </p:nvCxnSpPr>
         <p:spPr>
           <a:xfrm>
-            <a:off x="6094799" y="3028366"/>
+            <a:off x="5565171" y="3026397"/>
             <a:ext cx="218878" cy="3080"/>
           </a:xfrm>
           <a:prstGeom prst="bentConnector3">
@@ -7928,7 +7674,7 @@
         </p:nvSpPr>
         <p:spPr>
           <a:xfrm>
-            <a:off x="7712397" y="2564238"/>
+            <a:off x="7647458" y="2577114"/>
             <a:ext cx="708186" cy="285783"/>
           </a:xfrm>
           <a:prstGeom prst="rect">
@@ -7990,7 +7736,7 @@
         </p:nvSpPr>
         <p:spPr>
           <a:xfrm>
-            <a:off x="7041947" y="2948201"/>
+            <a:off x="6497675" y="2946232"/>
             <a:ext cx="236048" cy="173380"/>
           </a:xfrm>
           <a:prstGeom prst="flowChartDecision">
@@ -8045,7 +7791,7 @@
         </p:nvCxnSpPr>
         <p:spPr>
           <a:xfrm flipV="1">
-            <a:off x="7277995" y="2706821"/>
+            <a:off x="7211259" y="2704852"/>
             <a:ext cx="434402" cy="327761"/>
           </a:xfrm>
           <a:prstGeom prst="bentConnector3">
@@ -8089,7 +7835,7 @@
         </p:nvSpPr>
         <p:spPr>
           <a:xfrm>
-            <a:off x="7712397" y="2887216"/>
+            <a:off x="7647458" y="2900092"/>
             <a:ext cx="708186" cy="285783"/>
           </a:xfrm>
           <a:prstGeom prst="rect">
@@ -8151,11 +7897,13 @@
         </p:nvCxnSpPr>
         <p:spPr>
           <a:xfrm flipV="1">
-            <a:off x="7277995" y="3030108"/>
+            <a:off x="7211259" y="3028139"/>
             <a:ext cx="434402" cy="4783"/>
           </a:xfrm>
           <a:prstGeom prst="bentConnector3">
-            <a:avLst/>
+            <a:avLst>
+              <a:gd name="adj1" fmla="val -111685"/>
+            </a:avLst>
           </a:prstGeom>
           <a:ln w="19050">
             <a:solidFill>
@@ -8195,7 +7943,7 @@
         </p:nvSpPr>
         <p:spPr>
           <a:xfrm>
-            <a:off x="7712396" y="3210194"/>
+            <a:off x="7647457" y="3223070"/>
             <a:ext cx="898203" cy="285783"/>
           </a:xfrm>
           <a:prstGeom prst="rect">
@@ -8257,7 +8005,7 @@
         </p:nvCxnSpPr>
         <p:spPr>
           <a:xfrm>
-            <a:off x="7277995" y="3034891"/>
+            <a:off x="7211259" y="3032922"/>
             <a:ext cx="434402" cy="318195"/>
           </a:xfrm>
           <a:prstGeom prst="bentConnector3">
@@ -8301,7 +8049,7 @@
         </p:nvSpPr>
         <p:spPr>
           <a:xfrm>
-            <a:off x="7712397" y="3533171"/>
+            <a:off x="7647458" y="3546047"/>
             <a:ext cx="898202" cy="285783"/>
           </a:xfrm>
           <a:prstGeom prst="rect">
@@ -8363,7 +8111,7 @@
         </p:nvCxnSpPr>
         <p:spPr>
           <a:xfrm>
-            <a:off x="7277995" y="3034891"/>
+            <a:off x="7211259" y="3032922"/>
             <a:ext cx="434402" cy="641172"/>
           </a:xfrm>
           <a:prstGeom prst="bentConnector3">
@@ -8407,7 +8155,7 @@
         </p:nvCxnSpPr>
         <p:spPr>
           <a:xfrm rot="5400000">
-            <a:off x="3553611" y="2687559"/>
+            <a:off x="3023983" y="2685590"/>
             <a:ext cx="293825" cy="5938"/>
           </a:xfrm>
           <a:prstGeom prst="bentConnector3">
@@ -8454,7 +8202,7 @@
         </p:nvSpPr>
         <p:spPr>
           <a:xfrm rot="10800000" flipV="1">
-            <a:off x="3562299" y="2386554"/>
+            <a:off x="3032671" y="2384585"/>
             <a:ext cx="282387" cy="157062"/>
           </a:xfrm>
           <a:prstGeom prst="triangle">
@@ -8508,7 +8256,7 @@
         </p:nvSpPr>
         <p:spPr>
           <a:xfrm>
-            <a:off x="1260922" y="1998350"/>
+            <a:off x="731294" y="1996381"/>
             <a:ext cx="1443661" cy="364396"/>
           </a:xfrm>
           <a:prstGeom prst="rect">
@@ -8585,7 +8333,7 @@
         </p:nvSpPr>
         <p:spPr>
           <a:xfrm rot="16200000">
-            <a:off x="6362886" y="3586305"/>
+            <a:off x="5833258" y="3584336"/>
             <a:ext cx="881018" cy="261610"/>
           </a:xfrm>
           <a:prstGeom prst="rect">
@@ -8630,7 +8378,7 @@
         </p:nvSpPr>
         <p:spPr>
           <a:xfrm>
-            <a:off x="2057401" y="4239491"/>
+            <a:off x="1527773" y="4237522"/>
             <a:ext cx="1066800" cy="346760"/>
           </a:xfrm>
           <a:prstGeom prst="rect">
@@ -8707,7 +8455,7 @@
         </p:nvCxnSpPr>
         <p:spPr>
           <a:xfrm rot="16200000" flipH="1">
-            <a:off x="1364475" y="3719944"/>
+            <a:off x="834847" y="3717975"/>
             <a:ext cx="831471" cy="554381"/>
           </a:xfrm>
           <a:prstGeom prst="bentConnector2">
@@ -8752,7 +8500,7 @@
         </p:nvSpPr>
         <p:spPr>
           <a:xfrm>
-            <a:off x="4429979" y="3111479"/>
+            <a:off x="3900351" y="3109510"/>
             <a:ext cx="189257" cy="178683"/>
           </a:xfrm>
           <a:prstGeom prst="rect">
@@ -8797,7 +8545,7 @@
         </p:nvSpPr>
         <p:spPr>
           <a:xfrm>
-            <a:off x="6135256" y="3097917"/>
+            <a:off x="5605628" y="3095948"/>
             <a:ext cx="189257" cy="178683"/>
           </a:xfrm>
           <a:prstGeom prst="rect">
@@ -8842,7 +8590,7 @@
         </p:nvSpPr>
         <p:spPr>
           <a:xfrm>
-            <a:off x="2573394" y="2756715"/>
+            <a:off x="2043766" y="2754746"/>
             <a:ext cx="170110" cy="137542"/>
           </a:xfrm>
           <a:prstGeom prst="rect">
@@ -8887,7 +8635,7 @@
         </p:nvSpPr>
         <p:spPr>
           <a:xfrm>
-            <a:off x="2707070" y="3667737"/>
+            <a:off x="2177442" y="3665768"/>
             <a:ext cx="189257" cy="178683"/>
           </a:xfrm>
           <a:prstGeom prst="rect">
@@ -8932,7 +8680,7 @@
         </p:nvSpPr>
         <p:spPr>
           <a:xfrm>
-            <a:off x="6449896" y="3204826"/>
+            <a:off x="5920268" y="3202857"/>
             <a:ext cx="189257" cy="178683"/>
           </a:xfrm>
           <a:prstGeom prst="rect">
@@ -8977,7 +8725,7 @@
         </p:nvSpPr>
         <p:spPr>
           <a:xfrm>
-            <a:off x="7712397" y="2228817"/>
+            <a:off x="7647458" y="2241693"/>
             <a:ext cx="708186" cy="285783"/>
           </a:xfrm>
           <a:prstGeom prst="rect">
@@ -9041,7 +8789,7 @@
         </p:nvCxnSpPr>
         <p:spPr>
           <a:xfrm flipV="1">
-            <a:off x="7277995" y="2371709"/>
+            <a:off x="7211259" y="2369740"/>
             <a:ext cx="434402" cy="663182"/>
           </a:xfrm>
           <a:prstGeom prst="bentConnector3">
@@ -9087,7 +8835,7 @@
         </p:nvSpPr>
         <p:spPr>
           <a:xfrm>
-            <a:off x="7466243" y="2255711"/>
+            <a:off x="7401304" y="2268587"/>
             <a:ext cx="189257" cy="178683"/>
           </a:xfrm>
           <a:prstGeom prst="rect">
@@ -9132,7 +8880,7 @@
         </p:nvSpPr>
         <p:spPr>
           <a:xfrm>
-            <a:off x="3170181" y="1998350"/>
+            <a:off x="2640553" y="1996381"/>
             <a:ext cx="1060683" cy="364396"/>
           </a:xfrm>
           <a:prstGeom prst="rect">
@@ -9194,7 +8942,7 @@
         </p:nvCxnSpPr>
         <p:spPr>
           <a:xfrm>
-            <a:off x="4313097" y="3077561"/>
+            <a:off x="3783469" y="3075592"/>
             <a:ext cx="367678" cy="12320"/>
           </a:xfrm>
           <a:prstGeom prst="straightConnector1">
@@ -9238,7 +8986,7 @@
         </p:nvSpPr>
         <p:spPr>
           <a:xfrm rot="16200000">
-            <a:off x="2669073" y="2069158"/>
+            <a:off x="2139445" y="2067189"/>
             <a:ext cx="271014" cy="187417"/>
           </a:xfrm>
           <a:prstGeom prst="triangle">
@@ -9296,7 +9044,7 @@
         </p:nvCxnSpPr>
         <p:spPr>
           <a:xfrm>
-            <a:off x="2898289" y="2177727"/>
+            <a:off x="2368661" y="2175758"/>
             <a:ext cx="271892" cy="2821"/>
           </a:xfrm>
           <a:prstGeom prst="bentConnector3">
@@ -9343,7 +9091,7 @@
         </p:nvSpPr>
         <p:spPr>
           <a:xfrm>
-            <a:off x="7724272" y="3556921"/>
+            <a:off x="7659333" y="3569797"/>
             <a:ext cx="898202" cy="285783"/>
           </a:xfrm>
           <a:prstGeom prst="rect">
@@ -9405,7 +9153,7 @@
         </p:nvSpPr>
         <p:spPr>
           <a:xfrm>
-            <a:off x="7709428" y="3953708"/>
+            <a:off x="7644489" y="3966584"/>
             <a:ext cx="1205972" cy="285783"/>
           </a:xfrm>
           <a:prstGeom prst="rect">
@@ -9481,7 +9229,7 @@
         </p:nvCxnSpPr>
         <p:spPr>
           <a:xfrm rot="16200000" flipH="1">
-            <a:off x="7066783" y="3453955"/>
+            <a:off x="7001844" y="3466831"/>
             <a:ext cx="1068232" cy="217058"/>
           </a:xfrm>
           <a:prstGeom prst="bentConnector2">
@@ -9527,7 +9275,7 @@
         </p:nvCxnSpPr>
         <p:spPr>
           <a:xfrm rot="16200000" flipH="1">
-            <a:off x="7065299" y="3715749"/>
+            <a:off x="7000360" y="3728625"/>
             <a:ext cx="1068232" cy="217058"/>
           </a:xfrm>
           <a:prstGeom prst="bentConnector2">
@@ -9571,7 +9319,7 @@
         </p:nvSpPr>
         <p:spPr>
           <a:xfrm>
-            <a:off x="7724272" y="4269978"/>
+            <a:off x="7659333" y="4282854"/>
             <a:ext cx="898202" cy="285783"/>
           </a:xfrm>
           <a:prstGeom prst="rect">
@@ -9633,7 +9381,7 @@
         </p:nvSpPr>
         <p:spPr>
           <a:xfrm>
-            <a:off x="4684122" y="2391881"/>
+            <a:off x="4154494" y="2389912"/>
             <a:ext cx="1410677" cy="346760"/>
           </a:xfrm>
           <a:prstGeom prst="rect">
@@ -9666,7 +9414,7 @@
           <a:p>
             <a:pPr algn="ctr"/>
             <a:r>
-              <a:rPr lang="en-US" sz="1050" dirty="0" err="1">
+              <a:rPr lang="en-US" sz="1050" dirty="0">
                 <a:solidFill>
                   <a:srgbClr val="7030A0"/>
                 </a:solidFill>
@@ -9681,73 +9429,24 @@
           </a:p>
         </p:txBody>
       </p:sp>
-      <p:sp>
-        <p:nvSpPr>
-          <p:cNvPr id="59" name="Flowchart: Decision 96">
-            <a:extLst>
-              <a:ext uri="{FF2B5EF4-FFF2-40B4-BE49-F238E27FC236}">
-                <a16:creationId xmlns:a16="http://schemas.microsoft.com/office/drawing/2014/main" id="{E03D7ABF-FE78-754A-98BE-ED3F58DD8571}"/>
-              </a:ext>
-            </a:extLst>
-          </p:cNvPr>
-          <p:cNvSpPr/>
-          <p:nvPr/>
-        </p:nvSpPr>
-        <p:spPr>
-          <a:xfrm>
-            <a:off x="6103405" y="2371709"/>
-            <a:ext cx="236048" cy="173380"/>
-          </a:xfrm>
-          <a:prstGeom prst="flowChartDecision">
-            <a:avLst/>
-          </a:prstGeom>
-          <a:noFill/>
-          <a:ln w="19050">
-            <a:solidFill>
-              <a:srgbClr val="7030A0"/>
-            </a:solidFill>
-          </a:ln>
-          <a:effectLst/>
-        </p:spPr>
-        <p:style>
-          <a:lnRef idx="1">
-            <a:schemeClr val="accent6"/>
-          </a:lnRef>
-          <a:fillRef idx="2">
-            <a:schemeClr val="accent6"/>
-          </a:fillRef>
-          <a:effectRef idx="1">
-            <a:schemeClr val="accent6"/>
-          </a:effectRef>
-          <a:fontRef idx="minor">
-            <a:schemeClr val="dk1"/>
-          </a:fontRef>
-        </p:style>
-        <p:txBody>
-          <a:bodyPr rtlCol="0" anchor="ctr"/>
-          <a:lstStyle/>
-          <a:p>
-            <a:pPr algn="ctr"/>
-            <a:endParaRPr lang="en-US" sz="1050"/>
-          </a:p>
-        </p:txBody>
-      </p:sp>
       <p:cxnSp>
         <p:nvCxnSpPr>
-          <p:cNvPr id="60" name="Elbow Connector 59">
-            <a:extLst>
-              <a:ext uri="{FF2B5EF4-FFF2-40B4-BE49-F238E27FC236}">
-                <a16:creationId xmlns:a16="http://schemas.microsoft.com/office/drawing/2014/main" id="{8CAC36EE-2CE0-F44B-BD46-EF5ECD03E8C6}"/>
-              </a:ext>
-            </a:extLst>
-          </p:cNvPr>
-          <p:cNvCxnSpPr/>
+          <p:cNvPr id="62" name="Elbow Connector 61">
+            <a:extLst>
+              <a:ext uri="{FF2B5EF4-FFF2-40B4-BE49-F238E27FC236}">
+                <a16:creationId xmlns:a16="http://schemas.microsoft.com/office/drawing/2014/main" id="{22A36DA3-25A9-D34D-B281-C2721FBCD12B}"/>
+              </a:ext>
+            </a:extLst>
+          </p:cNvPr>
+          <p:cNvCxnSpPr>
+            <a:cxnSpLocks/>
+          </p:cNvCxnSpPr>
           <p:nvPr/>
         </p:nvCxnSpPr>
         <p:spPr>
-          <a:xfrm>
-            <a:off x="6339453" y="2458399"/>
-            <a:ext cx="218878" cy="3080"/>
+          <a:xfrm flipV="1">
+            <a:off x="5565171" y="2645774"/>
+            <a:ext cx="463532" cy="1"/>
           </a:xfrm>
           <a:prstGeom prst="bentConnector3">
             <a:avLst/>
@@ -9778,10 +9477,10 @@
       </p:cxnSp>
       <p:sp>
         <p:nvSpPr>
-          <p:cNvPr id="61" name="Flowchart: Decision 96">
-            <a:extLst>
-              <a:ext uri="{FF2B5EF4-FFF2-40B4-BE49-F238E27FC236}">
-                <a16:creationId xmlns:a16="http://schemas.microsoft.com/office/drawing/2014/main" id="{849B64A2-9803-1A4B-8AB8-808350190F2A}"/>
+          <p:cNvPr id="65" name="Rectangle 8">
+            <a:extLst>
+              <a:ext uri="{FF2B5EF4-FFF2-40B4-BE49-F238E27FC236}">
+                <a16:creationId xmlns:a16="http://schemas.microsoft.com/office/drawing/2014/main" id="{DEB73995-71BE-AE49-921E-CDA4E57BA5BA}"/>
               </a:ext>
             </a:extLst>
           </p:cNvPr>
@@ -9790,13 +9489,150 @@
         </p:nvSpPr>
         <p:spPr>
           <a:xfrm>
-            <a:off x="6103405" y="2627135"/>
+            <a:off x="6028703" y="1960503"/>
+            <a:ext cx="1232577" cy="380461"/>
+          </a:xfrm>
+          <a:prstGeom prst="rect">
+            <a:avLst/>
+          </a:prstGeom>
+          <a:ln w="19050">
+            <a:solidFill>
+              <a:srgbClr val="7030A0"/>
+            </a:solidFill>
+          </a:ln>
+          <a:effectLst/>
+        </p:spPr>
+        <p:style>
+          <a:lnRef idx="1">
+            <a:schemeClr val="accent4"/>
+          </a:lnRef>
+          <a:fillRef idx="2">
+            <a:schemeClr val="accent4"/>
+          </a:fillRef>
+          <a:effectRef idx="1">
+            <a:schemeClr val="accent4"/>
+          </a:effectRef>
+          <a:fontRef idx="minor">
+            <a:schemeClr val="dk1"/>
+          </a:fontRef>
+        </p:style>
+        <p:txBody>
+          <a:bodyPr rtlCol="0" anchor="ctr"/>
+          <a:lstStyle/>
+          <a:p>
+            <a:pPr algn="ctr"/>
+            <a:r>
+              <a:rPr lang="en-US" sz="1050" dirty="0">
+                <a:solidFill>
+                  <a:srgbClr val="7030A0"/>
+                </a:solidFill>
+              </a:rPr>
+              <a:t>&lt;&lt;Enumeration&gt;&gt;</a:t>
+            </a:r>
+          </a:p>
+          <a:p>
+            <a:pPr algn="ctr"/>
+            <a:r>
+              <a:rPr lang="en-US" sz="1050" dirty="0">
+                <a:solidFill>
+                  <a:srgbClr val="7030A0"/>
+                </a:solidFill>
+              </a:rPr>
+              <a:t>Level</a:t>
+            </a:r>
+            <a:endParaRPr lang="en-SG" sz="1050" dirty="0">
+              <a:solidFill>
+                <a:srgbClr val="7030A0"/>
+              </a:solidFill>
+            </a:endParaRPr>
+          </a:p>
+        </p:txBody>
+      </p:sp>
+      <p:sp>
+        <p:nvSpPr>
+          <p:cNvPr id="66" name="Rectangle 8">
+            <a:extLst>
+              <a:ext uri="{FF2B5EF4-FFF2-40B4-BE49-F238E27FC236}">
+                <a16:creationId xmlns:a16="http://schemas.microsoft.com/office/drawing/2014/main" id="{5ADC9355-87D7-CD4D-AAF2-7FACFD361B12}"/>
+              </a:ext>
+            </a:extLst>
+          </p:cNvPr>
+          <p:cNvSpPr/>
+          <p:nvPr/>
+        </p:nvSpPr>
+        <p:spPr>
+          <a:xfrm>
+            <a:off x="6042352" y="2482125"/>
+            <a:ext cx="708186" cy="327299"/>
+          </a:xfrm>
+          <a:prstGeom prst="rect">
+            <a:avLst/>
+          </a:prstGeom>
+          <a:ln w="19050">
+            <a:solidFill>
+              <a:srgbClr val="7030A0"/>
+            </a:solidFill>
+          </a:ln>
+          <a:effectLst/>
+        </p:spPr>
+        <p:style>
+          <a:lnRef idx="1">
+            <a:schemeClr val="accent4"/>
+          </a:lnRef>
+          <a:fillRef idx="2">
+            <a:schemeClr val="accent4"/>
+          </a:fillRef>
+          <a:effectRef idx="1">
+            <a:schemeClr val="accent4"/>
+          </a:effectRef>
+          <a:fontRef idx="minor">
+            <a:schemeClr val="dk1"/>
+          </a:fontRef>
+        </p:style>
+        <p:txBody>
+          <a:bodyPr rtlCol="0" anchor="ctr"/>
+          <a:lstStyle/>
+          <a:p>
+            <a:pPr algn="ctr"/>
+            <a:r>
+              <a:rPr lang="en-US" sz="1050" dirty="0" err="1">
+                <a:solidFill>
+                  <a:srgbClr val="7030A0"/>
+                </a:solidFill>
+              </a:rPr>
+              <a:t>Xp</a:t>
+            </a:r>
+            <a:endParaRPr lang="en-SG" sz="1050" dirty="0">
+              <a:solidFill>
+                <a:srgbClr val="7030A0"/>
+              </a:solidFill>
+            </a:endParaRPr>
+          </a:p>
+        </p:txBody>
+      </p:sp>
+      <p:sp>
+        <p:nvSpPr>
+          <p:cNvPr id="67" name="Flowchart: Decision 96">
+            <a:extLst>
+              <a:ext uri="{FF2B5EF4-FFF2-40B4-BE49-F238E27FC236}">
+                <a16:creationId xmlns:a16="http://schemas.microsoft.com/office/drawing/2014/main" id="{AEB1F82F-7E98-514B-81DC-C0CCAC98EC20}"/>
+              </a:ext>
+            </a:extLst>
+          </p:cNvPr>
+          <p:cNvSpPr/>
+          <p:nvPr/>
+        </p:nvSpPr>
+        <p:spPr>
+          <a:xfrm>
+            <a:off x="3783469" y="2769839"/>
             <a:ext cx="236048" cy="173380"/>
           </a:xfrm>
           <a:prstGeom prst="flowChartDecision">
             <a:avLst/>
           </a:prstGeom>
-          <a:noFill/>
+          <a:solidFill>
+            <a:srgbClr val="7030A0"/>
+          </a:solidFill>
           <a:ln w="19050">
             <a:solidFill>
               <a:srgbClr val="7030A0"/>
@@ -9829,22 +9665,114 @@
       </p:sp>
       <p:cxnSp>
         <p:nvCxnSpPr>
-          <p:cNvPr id="62" name="Elbow Connector 61">
-            <a:extLst>
-              <a:ext uri="{FF2B5EF4-FFF2-40B4-BE49-F238E27FC236}">
-                <a16:creationId xmlns:a16="http://schemas.microsoft.com/office/drawing/2014/main" id="{22A36DA3-25A9-D34D-B281-C2721FBCD12B}"/>
-              </a:ext>
-            </a:extLst>
-          </p:cNvPr>
-          <p:cNvCxnSpPr/>
+          <p:cNvPr id="69" name="Elbow Connector 68">
+            <a:extLst>
+              <a:ext uri="{FF2B5EF4-FFF2-40B4-BE49-F238E27FC236}">
+                <a16:creationId xmlns:a16="http://schemas.microsoft.com/office/drawing/2014/main" id="{B358619E-6D07-794D-8A55-F76D62B92AC3}"/>
+              </a:ext>
+            </a:extLst>
+          </p:cNvPr>
+          <p:cNvCxnSpPr>
+            <a:stCxn id="67" idx="3"/>
+            <a:endCxn id="58" idx="1"/>
+          </p:cNvCxnSpPr>
           <p:nvPr/>
         </p:nvCxnSpPr>
         <p:spPr>
-          <a:xfrm>
-            <a:off x="6339453" y="2713825"/>
-            <a:ext cx="218878" cy="3080"/>
+          <a:xfrm flipV="1">
+            <a:off x="4019517" y="2563292"/>
+            <a:ext cx="134977" cy="293237"/>
           </a:xfrm>
           <a:prstGeom prst="bentConnector3">
+            <a:avLst>
+              <a:gd name="adj1" fmla="val 14808"/>
+            </a:avLst>
+          </a:prstGeom>
+          <a:ln w="9525" cap="flat" cmpd="sng" algn="ctr">
+            <a:solidFill>
+              <a:schemeClr val="accent4"/>
+            </a:solidFill>
+            <a:prstDash val="solid"/>
+            <a:round/>
+            <a:headEnd type="none" w="med" len="med"/>
+            <a:tailEnd type="arrow" w="med" len="med"/>
+          </a:ln>
+        </p:spPr>
+        <p:style>
+          <a:lnRef idx="0">
+            <a:scrgbClr r="0" g="0" b="0"/>
+          </a:lnRef>
+          <a:fillRef idx="0">
+            <a:scrgbClr r="0" g="0" b="0"/>
+          </a:fillRef>
+          <a:effectRef idx="0">
+            <a:scrgbClr r="0" g="0" b="0"/>
+          </a:effectRef>
+          <a:fontRef idx="minor">
+            <a:schemeClr val="tx1"/>
+          </a:fontRef>
+        </p:style>
+      </p:cxnSp>
+      <p:sp>
+        <p:nvSpPr>
+          <p:cNvPr id="71" name="TextBox 70">
+            <a:extLst>
+              <a:ext uri="{FF2B5EF4-FFF2-40B4-BE49-F238E27FC236}">
+                <a16:creationId xmlns:a16="http://schemas.microsoft.com/office/drawing/2014/main" id="{ABD25197-E631-414A-8EC8-233EBF71A8ED}"/>
+              </a:ext>
+            </a:extLst>
+          </p:cNvPr>
+          <p:cNvSpPr txBox="1"/>
+          <p:nvPr/>
+        </p:nvSpPr>
+        <p:spPr>
+          <a:xfrm>
+            <a:off x="3923865" y="2340005"/>
+            <a:ext cx="250390" cy="246221"/>
+          </a:xfrm>
+          <a:prstGeom prst="rect">
+            <a:avLst/>
+          </a:prstGeom>
+          <a:noFill/>
+        </p:spPr>
+        <p:txBody>
+          <a:bodyPr wrap="none" rtlCol="0">
+            <a:spAutoFit/>
+          </a:bodyPr>
+          <a:lstStyle/>
+          <a:p>
+            <a:r>
+              <a:rPr lang="en-US" sz="1000" dirty="0">
+                <a:solidFill>
+                  <a:srgbClr val="7030A0"/>
+                </a:solidFill>
+              </a:rPr>
+              <a:t>1</a:t>
+            </a:r>
+          </a:p>
+        </p:txBody>
+      </p:sp>
+      <p:cxnSp>
+        <p:nvCxnSpPr>
+          <p:cNvPr id="74" name="Straight Arrow Connector 73">
+            <a:extLst>
+              <a:ext uri="{FF2B5EF4-FFF2-40B4-BE49-F238E27FC236}">
+                <a16:creationId xmlns:a16="http://schemas.microsoft.com/office/drawing/2014/main" id="{1DAC0F4F-CA6A-AF4A-A3FF-7943E4089968}"/>
+              </a:ext>
+            </a:extLst>
+          </p:cNvPr>
+          <p:cNvCxnSpPr>
+            <a:cxnSpLocks/>
+            <a:endCxn id="3" idx="1"/>
+          </p:cNvCxnSpPr>
+          <p:nvPr/>
+        </p:nvCxnSpPr>
+        <p:spPr>
+          <a:xfrm flipV="1">
+            <a:off x="2069898" y="3634651"/>
+            <a:ext cx="277654" cy="5132"/>
+          </a:xfrm>
+          <a:prstGeom prst="straightConnector1">
             <a:avLst/>
           </a:prstGeom>
           <a:ln w="19050">
@@ -9871,324 +9799,50 @@
           </a:fontRef>
         </p:style>
       </p:cxnSp>
-      <p:sp>
-        <p:nvSpPr>
-          <p:cNvPr id="65" name="Rectangle 8">
-            <a:extLst>
-              <a:ext uri="{FF2B5EF4-FFF2-40B4-BE49-F238E27FC236}">
-                <a16:creationId xmlns:a16="http://schemas.microsoft.com/office/drawing/2014/main" id="{DEB73995-71BE-AE49-921E-CDA4E57BA5BA}"/>
-              </a:ext>
-            </a:extLst>
-          </p:cNvPr>
-          <p:cNvSpPr/>
-          <p:nvPr/>
-        </p:nvSpPr>
-        <p:spPr>
-          <a:xfrm>
-            <a:off x="6558331" y="1951614"/>
-            <a:ext cx="767888" cy="589738"/>
-          </a:xfrm>
-          <a:prstGeom prst="rect">
-            <a:avLst/>
-          </a:prstGeom>
-          <a:ln w="19050">
-            <a:solidFill>
-              <a:srgbClr val="7030A0"/>
-            </a:solidFill>
-          </a:ln>
-          <a:effectLst/>
-        </p:spPr>
-        <p:style>
-          <a:lnRef idx="1">
-            <a:schemeClr val="accent4"/>
-          </a:lnRef>
-          <a:fillRef idx="2">
-            <a:schemeClr val="accent4"/>
-          </a:fillRef>
-          <a:effectRef idx="1">
-            <a:schemeClr val="accent4"/>
-          </a:effectRef>
-          <a:fontRef idx="minor">
-            <a:schemeClr val="dk1"/>
-          </a:fontRef>
-        </p:style>
-        <p:txBody>
-          <a:bodyPr rtlCol="0" anchor="ctr"/>
-          <a:lstStyle/>
-          <a:p>
-            <a:pPr algn="ctr"/>
-            <a:r>
-              <a:rPr lang="en-US" sz="1050" dirty="0">
-                <a:solidFill>
-                  <a:srgbClr val="7030A0"/>
-                </a:solidFill>
-              </a:rPr>
-              <a:t>&lt;&lt;Enumeration&gt;&gt;</a:t>
-            </a:r>
-          </a:p>
-          <a:p>
-            <a:pPr algn="ctr"/>
-            <a:r>
-              <a:rPr lang="en-US" sz="1050" dirty="0">
-                <a:solidFill>
-                  <a:srgbClr val="7030A0"/>
-                </a:solidFill>
-              </a:rPr>
-              <a:t>Level</a:t>
-            </a:r>
-            <a:endParaRPr lang="en-SG" sz="1050" dirty="0">
-              <a:solidFill>
-                <a:srgbClr val="7030A0"/>
-              </a:solidFill>
-            </a:endParaRPr>
-          </a:p>
-        </p:txBody>
-      </p:sp>
-      <p:sp>
-        <p:nvSpPr>
-          <p:cNvPr id="66" name="Rectangle 8">
-            <a:extLst>
-              <a:ext uri="{FF2B5EF4-FFF2-40B4-BE49-F238E27FC236}">
-                <a16:creationId xmlns:a16="http://schemas.microsoft.com/office/drawing/2014/main" id="{5ADC9355-87D7-CD4D-AAF2-7FACFD361B12}"/>
-              </a:ext>
-            </a:extLst>
-          </p:cNvPr>
-          <p:cNvSpPr/>
-          <p:nvPr/>
-        </p:nvSpPr>
-        <p:spPr>
-          <a:xfrm>
-            <a:off x="6571980" y="2609571"/>
-            <a:ext cx="708186" cy="201822"/>
-          </a:xfrm>
-          <a:prstGeom prst="rect">
-            <a:avLst/>
-          </a:prstGeom>
-          <a:ln w="19050">
-            <a:solidFill>
-              <a:srgbClr val="7030A0"/>
-            </a:solidFill>
-          </a:ln>
-          <a:effectLst/>
-        </p:spPr>
-        <p:style>
-          <a:lnRef idx="1">
-            <a:schemeClr val="accent4"/>
-          </a:lnRef>
-          <a:fillRef idx="2">
-            <a:schemeClr val="accent4"/>
-          </a:fillRef>
-          <a:effectRef idx="1">
-            <a:schemeClr val="accent4"/>
-          </a:effectRef>
-          <a:fontRef idx="minor">
-            <a:schemeClr val="dk1"/>
-          </a:fontRef>
-        </p:style>
-        <p:txBody>
-          <a:bodyPr rtlCol="0" anchor="ctr"/>
-          <a:lstStyle/>
-          <a:p>
-            <a:pPr algn="ctr"/>
-            <a:r>
-              <a:rPr lang="en-US" sz="1050" dirty="0" err="1">
-                <a:solidFill>
-                  <a:srgbClr val="7030A0"/>
-                </a:solidFill>
-              </a:rPr>
-              <a:t>Xp</a:t>
-            </a:r>
-            <a:endParaRPr lang="en-SG" sz="1050" dirty="0">
-              <a:solidFill>
-                <a:srgbClr val="7030A0"/>
-              </a:solidFill>
-            </a:endParaRPr>
-          </a:p>
-        </p:txBody>
-      </p:sp>
-      <p:sp>
-        <p:nvSpPr>
-          <p:cNvPr id="67" name="Flowchart: Decision 96">
-            <a:extLst>
-              <a:ext uri="{FF2B5EF4-FFF2-40B4-BE49-F238E27FC236}">
-                <a16:creationId xmlns:a16="http://schemas.microsoft.com/office/drawing/2014/main" id="{AEB1F82F-7E98-514B-81DC-C0CCAC98EC20}"/>
-              </a:ext>
-            </a:extLst>
-          </p:cNvPr>
-          <p:cNvSpPr/>
-          <p:nvPr/>
-        </p:nvSpPr>
-        <p:spPr>
-          <a:xfrm>
-            <a:off x="4313097" y="2771808"/>
-            <a:ext cx="236048" cy="173380"/>
-          </a:xfrm>
-          <a:prstGeom prst="flowChartDecision">
-            <a:avLst/>
-          </a:prstGeom>
-          <a:solidFill>
-            <a:srgbClr val="7030A0"/>
-          </a:solidFill>
-          <a:ln w="19050">
-            <a:solidFill>
-              <a:srgbClr val="7030A0"/>
-            </a:solidFill>
-          </a:ln>
-          <a:effectLst/>
-        </p:spPr>
-        <p:style>
-          <a:lnRef idx="1">
-            <a:schemeClr val="accent6"/>
-          </a:lnRef>
-          <a:fillRef idx="2">
-            <a:schemeClr val="accent6"/>
-          </a:fillRef>
-          <a:effectRef idx="1">
-            <a:schemeClr val="accent6"/>
-          </a:effectRef>
-          <a:fontRef idx="minor">
-            <a:schemeClr val="dk1"/>
-          </a:fontRef>
-        </p:style>
-        <p:txBody>
-          <a:bodyPr rtlCol="0" anchor="ctr"/>
-          <a:lstStyle/>
-          <a:p>
-            <a:pPr algn="ctr"/>
-            <a:endParaRPr lang="en-US" sz="1050"/>
-          </a:p>
-        </p:txBody>
-      </p:sp>
       <p:cxnSp>
         <p:nvCxnSpPr>
-          <p:cNvPr id="69" name="Elbow Connector 68">
-            <a:extLst>
-              <a:ext uri="{FF2B5EF4-FFF2-40B4-BE49-F238E27FC236}">
-                <a16:creationId xmlns:a16="http://schemas.microsoft.com/office/drawing/2014/main" id="{B358619E-6D07-794D-8A55-F76D62B92AC3}"/>
+          <p:cNvPr id="52" name="Elbow Connector 51">
+            <a:extLst>
+              <a:ext uri="{FF2B5EF4-FFF2-40B4-BE49-F238E27FC236}">
+                <a16:creationId xmlns:a16="http://schemas.microsoft.com/office/drawing/2014/main" id="{2DD2D145-F472-9D4E-A835-CB7F39198306}"/>
               </a:ext>
             </a:extLst>
           </p:cNvPr>
           <p:cNvCxnSpPr>
-            <a:stCxn id="67" idx="3"/>
-            <a:endCxn id="58" idx="1"/>
+            <a:stCxn id="58" idx="3"/>
           </p:cNvCxnSpPr>
           <p:nvPr/>
         </p:nvCxnSpPr>
         <p:spPr>
           <a:xfrm flipV="1">
-            <a:off x="4549145" y="2565261"/>
-            <a:ext cx="134977" cy="293237"/>
+            <a:off x="5565171" y="2175758"/>
+            <a:ext cx="463532" cy="387534"/>
           </a:xfrm>
           <a:prstGeom prst="bentConnector3">
-            <a:avLst>
-              <a:gd name="adj1" fmla="val 14808"/>
-            </a:avLst>
-          </a:prstGeom>
-          <a:ln>
+            <a:avLst/>
+          </a:prstGeom>
+          <a:ln w="9525" cap="flat" cmpd="sng" algn="ctr">
             <a:solidFill>
-              <a:srgbClr val="7030A0"/>
+              <a:schemeClr val="accent4"/>
             </a:solidFill>
-            <a:tailEnd type="triangle"/>
+            <a:prstDash val="solid"/>
+            <a:round/>
+            <a:headEnd type="none" w="med" len="med"/>
+            <a:tailEnd type="arrow" w="med" len="med"/>
           </a:ln>
         </p:spPr>
         <p:style>
-          <a:lnRef idx="1">
-            <a:schemeClr val="accent1"/>
+          <a:lnRef idx="0">
+            <a:scrgbClr r="0" g="0" b="0"/>
           </a:lnRef>
           <a:fillRef idx="0">
-            <a:schemeClr val="accent1"/>
+            <a:scrgbClr r="0" g="0" b="0"/>
           </a:fillRef>
           <a:effectRef idx="0">
-            <a:schemeClr val="accent1"/>
+            <a:scrgbClr r="0" g="0" b="0"/>
           </a:effectRef>
           <a:fontRef idx="minor">
             <a:schemeClr val="tx1"/>
-          </a:fontRef>
-        </p:style>
-      </p:cxnSp>
-      <p:sp>
-        <p:nvSpPr>
-          <p:cNvPr id="71" name="TextBox 70">
-            <a:extLst>
-              <a:ext uri="{FF2B5EF4-FFF2-40B4-BE49-F238E27FC236}">
-                <a16:creationId xmlns:a16="http://schemas.microsoft.com/office/drawing/2014/main" id="{ABD25197-E631-414A-8EC8-233EBF71A8ED}"/>
-              </a:ext>
-            </a:extLst>
-          </p:cNvPr>
-          <p:cNvSpPr txBox="1"/>
-          <p:nvPr/>
-        </p:nvSpPr>
-        <p:spPr>
-          <a:xfrm>
-            <a:off x="4453493" y="2341974"/>
-            <a:ext cx="250390" cy="246221"/>
-          </a:xfrm>
-          <a:prstGeom prst="rect">
-            <a:avLst/>
-          </a:prstGeom>
-          <a:noFill/>
-        </p:spPr>
-        <p:txBody>
-          <a:bodyPr wrap="none" rtlCol="0">
-            <a:spAutoFit/>
-          </a:bodyPr>
-          <a:lstStyle/>
-          <a:p>
-            <a:r>
-              <a:rPr lang="en-US" sz="1000" dirty="0">
-                <a:solidFill>
-                  <a:srgbClr val="7030A0"/>
-                </a:solidFill>
-              </a:rPr>
-              <a:t>1</a:t>
-            </a:r>
-          </a:p>
-        </p:txBody>
-      </p:sp>
-      <p:cxnSp>
-        <p:nvCxnSpPr>
-          <p:cNvPr id="74" name="Straight Arrow Connector 73">
-            <a:extLst>
-              <a:ext uri="{FF2B5EF4-FFF2-40B4-BE49-F238E27FC236}">
-                <a16:creationId xmlns:a16="http://schemas.microsoft.com/office/drawing/2014/main" id="{1DAC0F4F-CA6A-AF4A-A3FF-7943E4089968}"/>
-              </a:ext>
-            </a:extLst>
-          </p:cNvPr>
-          <p:cNvCxnSpPr>
-            <a:cxnSpLocks/>
-            <a:endCxn id="3" idx="1"/>
-          </p:cNvCxnSpPr>
-          <p:nvPr/>
-        </p:nvCxnSpPr>
-        <p:spPr>
-          <a:xfrm flipV="1">
-            <a:off x="2599526" y="3636620"/>
-            <a:ext cx="277654" cy="5132"/>
-          </a:xfrm>
-          <a:prstGeom prst="straightConnector1">
-            <a:avLst/>
-          </a:prstGeom>
-          <a:ln w="19050">
-            <a:solidFill>
-              <a:srgbClr val="7030A0"/>
-            </a:solidFill>
-            <a:headEnd type="none" w="med" len="med"/>
-            <a:tailEnd type="arrow" w="med" len="med"/>
-          </a:ln>
-          <a:effectLst/>
-        </p:spPr>
-        <p:style>
-          <a:lnRef idx="1">
-            <a:schemeClr val="accent2"/>
-          </a:lnRef>
-          <a:fillRef idx="2">
-            <a:schemeClr val="accent2"/>
-          </a:fillRef>
-          <a:effectRef idx="1">
-            <a:schemeClr val="accent2"/>
-          </a:effectRef>
-          <a:fontRef idx="minor">
-            <a:schemeClr val="dk1"/>
           </a:fontRef>
         </p:style>
       </p:cxnSp>

</xml_diff>

<commit_message>
Modify dev guide and ppp
</commit_message>
<xml_diff>
--- a/docs/diagrams/AchievementDiagrams.pptx
+++ b/docs/diagrams/AchievementDiagrams.pptx
@@ -211,7 +211,7 @@
           <a:p>
             <a:fld id="{F5CC4B3F-88C1-4FFA-B1B6-F41C21DC6924}" type="datetimeFigureOut">
               <a:rPr lang="en-US" smtClean="0"/>
-              <a:t>11/1/18</a:t>
+              <a:t>11/12/18</a:t>
             </a:fld>
             <a:endParaRPr lang="en-US"/>
           </a:p>
@@ -741,7 +741,7 @@
           <a:p>
             <a:fld id="{78C97017-6FC3-485B-9764-EAC9E56C1D49}" type="datetimeFigureOut">
               <a:rPr lang="en-US" smtClean="0"/>
-              <a:t>11/1/18</a:t>
+              <a:t>11/12/18</a:t>
             </a:fld>
             <a:endParaRPr lang="en-US"/>
           </a:p>
@@ -909,7 +909,7 @@
           <a:p>
             <a:fld id="{78C97017-6FC3-485B-9764-EAC9E56C1D49}" type="datetimeFigureOut">
               <a:rPr lang="en-US" smtClean="0"/>
-              <a:t>11/1/18</a:t>
+              <a:t>11/12/18</a:t>
             </a:fld>
             <a:endParaRPr lang="en-US"/>
           </a:p>
@@ -1087,7 +1087,7 @@
           <a:p>
             <a:fld id="{78C97017-6FC3-485B-9764-EAC9E56C1D49}" type="datetimeFigureOut">
               <a:rPr lang="en-US" smtClean="0"/>
-              <a:t>11/1/18</a:t>
+              <a:t>11/12/18</a:t>
             </a:fld>
             <a:endParaRPr lang="en-US"/>
           </a:p>
@@ -1255,7 +1255,7 @@
           <a:p>
             <a:fld id="{78C97017-6FC3-485B-9764-EAC9E56C1D49}" type="datetimeFigureOut">
               <a:rPr lang="en-US" smtClean="0"/>
-              <a:t>11/1/18</a:t>
+              <a:t>11/12/18</a:t>
             </a:fld>
             <a:endParaRPr lang="en-US"/>
           </a:p>
@@ -1500,7 +1500,7 @@
           <a:p>
             <a:fld id="{78C97017-6FC3-485B-9764-EAC9E56C1D49}" type="datetimeFigureOut">
               <a:rPr lang="en-US" smtClean="0"/>
-              <a:t>11/1/18</a:t>
+              <a:t>11/12/18</a:t>
             </a:fld>
             <a:endParaRPr lang="en-US"/>
           </a:p>
@@ -1785,7 +1785,7 @@
           <a:p>
             <a:fld id="{78C97017-6FC3-485B-9764-EAC9E56C1D49}" type="datetimeFigureOut">
               <a:rPr lang="en-US" smtClean="0"/>
-              <a:t>11/1/18</a:t>
+              <a:t>11/12/18</a:t>
             </a:fld>
             <a:endParaRPr lang="en-US"/>
           </a:p>
@@ -2204,7 +2204,7 @@
           <a:p>
             <a:fld id="{78C97017-6FC3-485B-9764-EAC9E56C1D49}" type="datetimeFigureOut">
               <a:rPr lang="en-US" smtClean="0"/>
-              <a:t>11/1/18</a:t>
+              <a:t>11/12/18</a:t>
             </a:fld>
             <a:endParaRPr lang="en-US"/>
           </a:p>
@@ -2321,7 +2321,7 @@
           <a:p>
             <a:fld id="{78C97017-6FC3-485B-9764-EAC9E56C1D49}" type="datetimeFigureOut">
               <a:rPr lang="en-US" smtClean="0"/>
-              <a:t>11/1/18</a:t>
+              <a:t>11/12/18</a:t>
             </a:fld>
             <a:endParaRPr lang="en-US"/>
           </a:p>
@@ -2416,7 +2416,7 @@
           <a:p>
             <a:fld id="{78C97017-6FC3-485B-9764-EAC9E56C1D49}" type="datetimeFigureOut">
               <a:rPr lang="en-US" smtClean="0"/>
-              <a:t>11/1/18</a:t>
+              <a:t>11/12/18</a:t>
             </a:fld>
             <a:endParaRPr lang="en-US"/>
           </a:p>
@@ -2691,7 +2691,7 @@
           <a:p>
             <a:fld id="{78C97017-6FC3-485B-9764-EAC9E56C1D49}" type="datetimeFigureOut">
               <a:rPr lang="en-US" smtClean="0"/>
-              <a:t>11/1/18</a:t>
+              <a:t>11/12/18</a:t>
             </a:fld>
             <a:endParaRPr lang="en-US"/>
           </a:p>
@@ -2943,7 +2943,7 @@
           <a:p>
             <a:fld id="{78C97017-6FC3-485B-9764-EAC9E56C1D49}" type="datetimeFigureOut">
               <a:rPr lang="en-US" smtClean="0"/>
-              <a:t>11/1/18</a:t>
+              <a:t>11/12/18</a:t>
             </a:fld>
             <a:endParaRPr lang="en-US"/>
           </a:p>
@@ -3154,7 +3154,7 @@
           <a:p>
             <a:fld id="{78C97017-6FC3-485B-9764-EAC9E56C1D49}" type="datetimeFigureOut">
               <a:rPr lang="en-US" smtClean="0"/>
-              <a:t>11/1/18</a:t>
+              <a:t>11/12/18</a:t>
             </a:fld>
             <a:endParaRPr lang="en-US"/>
           </a:p>
@@ -3598,8 +3598,8 @@
         </p:nvSpPr>
         <p:spPr>
           <a:xfrm>
-            <a:off x="-194257" y="1398612"/>
-            <a:ext cx="2059008" cy="184666"/>
+            <a:off x="-812950" y="1275531"/>
+            <a:ext cx="2518466" cy="369332"/>
           </a:xfrm>
           <a:prstGeom prst="rect">
             <a:avLst/>
@@ -3639,7 +3639,19 @@
                   </a:schemeClr>
                 </a:solidFill>
               </a:rPr>
-              <a:t>Task, Task</a:t>
+              <a:t>target,</a:t>
+            </a:r>
+          </a:p>
+          <a:p>
+            <a:r>
+              <a:rPr lang="en-US" sz="1200" dirty="0">
+                <a:solidFill>
+                  <a:schemeClr val="accent4">
+                    <a:lumMod val="75000"/>
+                  </a:schemeClr>
+                </a:solidFill>
+              </a:rPr>
+              <a:t>updatedTask</a:t>
             </a:r>
             <a:r>
               <a:rPr lang="en-US" sz="1200" dirty="0">
@@ -3957,7 +3969,7 @@
         </p:nvSpPr>
         <p:spPr>
           <a:xfrm>
-            <a:off x="3337897" y="2118370"/>
+            <a:off x="3048000" y="2118370"/>
             <a:ext cx="3001266" cy="184666"/>
           </a:xfrm>
           <a:prstGeom prst="rect">
@@ -3988,7 +4000,7 @@
                   <a:srgbClr val="7030A0"/>
                 </a:solidFill>
               </a:rPr>
-              <a:t>incrementAchievementsWithNewXp(Integer)</a:t>
+              <a:t>incrementAchievementsWithNewXp(xp)</a:t>
             </a:r>
           </a:p>
         </p:txBody>
@@ -4091,7 +4103,7 @@
                   </a:schemeClr>
                 </a:solidFill>
               </a:rPr>
-              <a:t>(Integer)</a:t>
+              <a:t>(xp)</a:t>
             </a:r>
           </a:p>
         </p:txBody>
@@ -4494,8 +4506,8 @@
         </p:nvSpPr>
         <p:spPr>
           <a:xfrm>
-            <a:off x="5635844" y="3272696"/>
-            <a:ext cx="2915344" cy="215444"/>
+            <a:off x="6098114" y="3301416"/>
+            <a:ext cx="2915344" cy="184666"/>
           </a:xfrm>
           <a:prstGeom prst="rect">
             <a:avLst/>
@@ -4509,7 +4521,7 @@
           <a:lstStyle/>
           <a:p>
             <a:r>
-              <a:rPr lang="en-US" sz="1400" dirty="0">
+              <a:rPr lang="en-US" sz="1200" dirty="0">
                 <a:solidFill>
                   <a:schemeClr val="accent5">
                     <a:lumMod val="75000"/>
@@ -4874,8 +4886,8 @@
         </p:nvSpPr>
         <p:spPr>
           <a:xfrm>
-            <a:off x="5746003" y="2590800"/>
-            <a:ext cx="1093635" cy="346760"/>
+            <a:off x="5325142" y="2579542"/>
+            <a:ext cx="1950197" cy="346760"/>
           </a:xfrm>
           <a:prstGeom prst="rect">
             <a:avLst/>
@@ -4915,7 +4927,7 @@
                   <a:schemeClr val="bg1"/>
                 </a:solidFill>
               </a:rPr>
-              <a:t>:UI</a:t>
+              <a:t>:AchievementPanel</a:t>
             </a:r>
             <a:endParaRPr lang="en-SG" sz="1600" dirty="0">
               <a:solidFill>
@@ -5155,7 +5167,7 @@
                   <a:srgbClr val="00B050"/>
                 </a:solidFill>
               </a:rPr>
-              <a:t>handleAchievementLevelChangedEvent</a:t>
+              <a:t>handleAchievementsUpdatedEvent</a:t>
             </a:r>
           </a:p>
           <a:p>
@@ -5170,183 +5182,106 @@
           </a:p>
         </p:txBody>
       </p:sp>
-      <p:grpSp>
-        <p:nvGrpSpPr>
-          <p:cNvPr id="14" name="Group 13">
-            <a:extLst>
-              <a:ext uri="{FF2B5EF4-FFF2-40B4-BE49-F238E27FC236}">
-                <a16:creationId xmlns:a16="http://schemas.microsoft.com/office/drawing/2014/main" id="{651D460B-3ECF-D749-8C49-A03683A7FE2D}"/>
-              </a:ext>
-            </a:extLst>
-          </p:cNvPr>
-          <p:cNvGrpSpPr/>
-          <p:nvPr/>
-        </p:nvGrpSpPr>
-        <p:grpSpPr>
-          <a:xfrm>
-            <a:off x="6309000" y="3498799"/>
-            <a:ext cx="390422" cy="535030"/>
-            <a:chOff x="1306972" y="5190726"/>
-            <a:chExt cx="390422" cy="535030"/>
-          </a:xfrm>
-        </p:grpSpPr>
-        <p:sp>
-          <p:nvSpPr>
-            <p:cNvPr id="15" name="Freeform 14">
-              <a:extLst>
-                <a:ext uri="{FF2B5EF4-FFF2-40B4-BE49-F238E27FC236}">
-                  <a16:creationId xmlns:a16="http://schemas.microsoft.com/office/drawing/2014/main" id="{0C1074F8-5260-3541-8C12-10DBA6FA634F}"/>
-                </a:ext>
-              </a:extLst>
-            </p:cNvPr>
-            <p:cNvSpPr/>
-            <p:nvPr/>
-          </p:nvSpPr>
-          <p:spPr>
-            <a:xfrm rot="8724581" flipH="1">
-              <a:off x="1319459" y="5190726"/>
-              <a:ext cx="377935" cy="237922"/>
-            </a:xfrm>
-            <a:custGeom>
-              <a:avLst/>
-              <a:gdLst>
-                <a:gd name="connsiteX0" fmla="*/ 0 w 226400"/>
-                <a:gd name="connsiteY0" fmla="*/ 32920 h 171466"/>
-                <a:gd name="connsiteX1" fmla="*/ 157018 w 226400"/>
-                <a:gd name="connsiteY1" fmla="*/ 5211 h 171466"/>
-                <a:gd name="connsiteX2" fmla="*/ 221673 w 226400"/>
-                <a:gd name="connsiteY2" fmla="*/ 125284 h 171466"/>
-                <a:gd name="connsiteX3" fmla="*/ 36945 w 226400"/>
-                <a:gd name="connsiteY3" fmla="*/ 171466 h 171466"/>
-              </a:gdLst>
-              <a:ahLst/>
-              <a:cxnLst>
-                <a:cxn ang="0">
-                  <a:pos x="connsiteX0" y="connsiteY0"/>
-                </a:cxn>
-                <a:cxn ang="0">
-                  <a:pos x="connsiteX1" y="connsiteY1"/>
-                </a:cxn>
-                <a:cxn ang="0">
-                  <a:pos x="connsiteX2" y="connsiteY2"/>
-                </a:cxn>
-                <a:cxn ang="0">
-                  <a:pos x="connsiteX3" y="connsiteY3"/>
-                </a:cxn>
-              </a:cxnLst>
-              <a:rect l="l" t="t" r="r" b="b"/>
-              <a:pathLst>
-                <a:path w="226400" h="171466">
-                  <a:moveTo>
-                    <a:pt x="0" y="32920"/>
-                  </a:moveTo>
-                  <a:cubicBezTo>
-                    <a:pt x="60036" y="11368"/>
-                    <a:pt x="120073" y="-10183"/>
-                    <a:pt x="157018" y="5211"/>
-                  </a:cubicBezTo>
-                  <a:cubicBezTo>
-                    <a:pt x="193963" y="20605"/>
-                    <a:pt x="241685" y="97575"/>
-                    <a:pt x="221673" y="125284"/>
-                  </a:cubicBezTo>
-                  <a:cubicBezTo>
-                    <a:pt x="201661" y="152993"/>
-                    <a:pt x="119303" y="162229"/>
-                    <a:pt x="36945" y="171466"/>
-                  </a:cubicBezTo>
-                </a:path>
-              </a:pathLst>
-            </a:custGeom>
-            <a:ln w="19050">
-              <a:solidFill>
-                <a:srgbClr val="00B050"/>
-              </a:solidFill>
-              <a:headEnd type="arrow" w="med" len="med"/>
-              <a:tailEnd type="none" w="med" len="med"/>
-            </a:ln>
-          </p:spPr>
-          <p:style>
-            <a:lnRef idx="1">
-              <a:schemeClr val="accent1"/>
-            </a:lnRef>
-            <a:fillRef idx="0">
-              <a:schemeClr val="accent1"/>
-            </a:fillRef>
-            <a:effectRef idx="0">
-              <a:schemeClr val="accent1"/>
-            </a:effectRef>
-            <a:fontRef idx="minor">
-              <a:schemeClr val="tx1"/>
-            </a:fontRef>
-          </p:style>
-          <p:txBody>
-            <a:bodyPr rtlCol="0" anchor="ctr"/>
-            <a:lstStyle/>
-            <a:p>
-              <a:pPr algn="ctr"/>
-              <a:endParaRPr lang="en-SG"/>
-            </a:p>
-          </p:txBody>
-        </p:sp>
-        <p:sp>
-          <p:nvSpPr>
-            <p:cNvPr id="16" name="Rectangle 15">
-              <a:extLst>
-                <a:ext uri="{FF2B5EF4-FFF2-40B4-BE49-F238E27FC236}">
-                  <a16:creationId xmlns:a16="http://schemas.microsoft.com/office/drawing/2014/main" id="{70995C55-1704-6D46-992C-755A3E5C6594}"/>
-                </a:ext>
-              </a:extLst>
-            </p:cNvPr>
-            <p:cNvSpPr/>
-            <p:nvPr/>
-          </p:nvSpPr>
-          <p:spPr>
-            <a:xfrm flipV="1">
-              <a:off x="1306972" y="5444571"/>
-              <a:ext cx="94705" cy="281185"/>
-            </a:xfrm>
-            <a:prstGeom prst="rect">
-              <a:avLst/>
-            </a:prstGeom>
+      <p:sp>
+        <p:nvSpPr>
+          <p:cNvPr id="15" name="Freeform 14">
+            <a:extLst>
+              <a:ext uri="{FF2B5EF4-FFF2-40B4-BE49-F238E27FC236}">
+                <a16:creationId xmlns:a16="http://schemas.microsoft.com/office/drawing/2014/main" id="{0C1074F8-5260-3541-8C12-10DBA6FA634F}"/>
+              </a:ext>
+            </a:extLst>
+          </p:cNvPr>
+          <p:cNvSpPr/>
+          <p:nvPr/>
+        </p:nvSpPr>
+        <p:spPr>
+          <a:xfrm rot="9581587" flipH="1">
+            <a:off x="6326663" y="4003153"/>
+            <a:ext cx="324117" cy="240613"/>
+          </a:xfrm>
+          <a:custGeom>
+            <a:avLst/>
+            <a:gdLst>
+              <a:gd name="connsiteX0" fmla="*/ 0 w 226400"/>
+              <a:gd name="connsiteY0" fmla="*/ 32920 h 171466"/>
+              <a:gd name="connsiteX1" fmla="*/ 157018 w 226400"/>
+              <a:gd name="connsiteY1" fmla="*/ 5211 h 171466"/>
+              <a:gd name="connsiteX2" fmla="*/ 221673 w 226400"/>
+              <a:gd name="connsiteY2" fmla="*/ 125284 h 171466"/>
+              <a:gd name="connsiteX3" fmla="*/ 36945 w 226400"/>
+              <a:gd name="connsiteY3" fmla="*/ 171466 h 171466"/>
+            </a:gdLst>
+            <a:ahLst/>
+            <a:cxnLst>
+              <a:cxn ang="0">
+                <a:pos x="connsiteX0" y="connsiteY0"/>
+              </a:cxn>
+              <a:cxn ang="0">
+                <a:pos x="connsiteX1" y="connsiteY1"/>
+              </a:cxn>
+              <a:cxn ang="0">
+                <a:pos x="connsiteX2" y="connsiteY2"/>
+              </a:cxn>
+              <a:cxn ang="0">
+                <a:pos x="connsiteX3" y="connsiteY3"/>
+              </a:cxn>
+            </a:cxnLst>
+            <a:rect l="l" t="t" r="r" b="b"/>
+            <a:pathLst>
+              <a:path w="226400" h="171466">
+                <a:moveTo>
+                  <a:pt x="0" y="32920"/>
+                </a:moveTo>
+                <a:cubicBezTo>
+                  <a:pt x="60036" y="11368"/>
+                  <a:pt x="120073" y="-10183"/>
+                  <a:pt x="157018" y="5211"/>
+                </a:cubicBezTo>
+                <a:cubicBezTo>
+                  <a:pt x="193963" y="20605"/>
+                  <a:pt x="241685" y="97575"/>
+                  <a:pt x="221673" y="125284"/>
+                </a:cubicBezTo>
+                <a:cubicBezTo>
+                  <a:pt x="201661" y="152993"/>
+                  <a:pt x="119303" y="162229"/>
+                  <a:pt x="36945" y="171466"/>
+                </a:cubicBezTo>
+              </a:path>
+            </a:pathLst>
+          </a:custGeom>
+          <a:ln w="19050">
             <a:solidFill>
               <a:srgbClr val="00B050"/>
             </a:solidFill>
-            <a:ln>
-              <a:solidFill>
-                <a:schemeClr val="bg1"/>
-              </a:solidFill>
-            </a:ln>
-            <a:effectLst/>
-          </p:spPr>
-          <p:style>
-            <a:lnRef idx="1">
-              <a:schemeClr val="accent3"/>
-            </a:lnRef>
-            <a:fillRef idx="2">
-              <a:schemeClr val="accent3"/>
-            </a:fillRef>
-            <a:effectRef idx="1">
-              <a:schemeClr val="accent3"/>
-            </a:effectRef>
-            <a:fontRef idx="minor">
-              <a:schemeClr val="dk1"/>
-            </a:fontRef>
-          </p:style>
-          <p:txBody>
-            <a:bodyPr rtlCol="0" anchor="ctr"/>
-            <a:lstStyle/>
-            <a:p>
-              <a:pPr algn="ctr"/>
-              <a:endParaRPr lang="en-SG" sz="1400">
-                <a:solidFill>
-                  <a:schemeClr val="dk1"/>
-                </a:solidFill>
-              </a:endParaRPr>
-            </a:p>
-          </p:txBody>
-        </p:sp>
-      </p:grpSp>
+            <a:prstDash val="dash"/>
+            <a:headEnd type="arrow" w="med" len="med"/>
+            <a:tailEnd type="none" w="med" len="med"/>
+          </a:ln>
+        </p:spPr>
+        <p:style>
+          <a:lnRef idx="1">
+            <a:schemeClr val="accent1"/>
+          </a:lnRef>
+          <a:fillRef idx="0">
+            <a:schemeClr val="accent1"/>
+          </a:fillRef>
+          <a:effectRef idx="0">
+            <a:schemeClr val="accent1"/>
+          </a:effectRef>
+          <a:fontRef idx="minor">
+            <a:schemeClr val="tx1"/>
+          </a:fontRef>
+        </p:style>
+        <p:txBody>
+          <a:bodyPr rtlCol="0" anchor="ctr"/>
+          <a:lstStyle/>
+          <a:p>
+            <a:pPr algn="ctr"/>
+            <a:endParaRPr lang="en-SG"/>
+          </a:p>
+        </p:txBody>
+      </p:sp>
       <p:sp>
         <p:nvSpPr>
           <p:cNvPr id="17" name="TextBox 16">
@@ -5665,6 +5600,162 @@
           </a:fontRef>
         </p:style>
       </p:cxnSp>
+      <p:sp>
+        <p:nvSpPr>
+          <p:cNvPr id="24" name="Freeform 23">
+            <a:extLst>
+              <a:ext uri="{FF2B5EF4-FFF2-40B4-BE49-F238E27FC236}">
+                <a16:creationId xmlns:a16="http://schemas.microsoft.com/office/drawing/2014/main" id="{273B16FF-BB33-814E-90D0-24D4992E189E}"/>
+              </a:ext>
+            </a:extLst>
+          </p:cNvPr>
+          <p:cNvSpPr/>
+          <p:nvPr/>
+        </p:nvSpPr>
+        <p:spPr>
+          <a:xfrm rot="8724581" flipH="1">
+            <a:off x="6331998" y="3498799"/>
+            <a:ext cx="377935" cy="237922"/>
+          </a:xfrm>
+          <a:custGeom>
+            <a:avLst/>
+            <a:gdLst>
+              <a:gd name="connsiteX0" fmla="*/ 0 w 226400"/>
+              <a:gd name="connsiteY0" fmla="*/ 32920 h 171466"/>
+              <a:gd name="connsiteX1" fmla="*/ 157018 w 226400"/>
+              <a:gd name="connsiteY1" fmla="*/ 5211 h 171466"/>
+              <a:gd name="connsiteX2" fmla="*/ 221673 w 226400"/>
+              <a:gd name="connsiteY2" fmla="*/ 125284 h 171466"/>
+              <a:gd name="connsiteX3" fmla="*/ 36945 w 226400"/>
+              <a:gd name="connsiteY3" fmla="*/ 171466 h 171466"/>
+            </a:gdLst>
+            <a:ahLst/>
+            <a:cxnLst>
+              <a:cxn ang="0">
+                <a:pos x="connsiteX0" y="connsiteY0"/>
+              </a:cxn>
+              <a:cxn ang="0">
+                <a:pos x="connsiteX1" y="connsiteY1"/>
+              </a:cxn>
+              <a:cxn ang="0">
+                <a:pos x="connsiteX2" y="connsiteY2"/>
+              </a:cxn>
+              <a:cxn ang="0">
+                <a:pos x="connsiteX3" y="connsiteY3"/>
+              </a:cxn>
+            </a:cxnLst>
+            <a:rect l="l" t="t" r="r" b="b"/>
+            <a:pathLst>
+              <a:path w="226400" h="171466">
+                <a:moveTo>
+                  <a:pt x="0" y="32920"/>
+                </a:moveTo>
+                <a:cubicBezTo>
+                  <a:pt x="60036" y="11368"/>
+                  <a:pt x="120073" y="-10183"/>
+                  <a:pt x="157018" y="5211"/>
+                </a:cubicBezTo>
+                <a:cubicBezTo>
+                  <a:pt x="193963" y="20605"/>
+                  <a:pt x="241685" y="97575"/>
+                  <a:pt x="221673" y="125284"/>
+                </a:cubicBezTo>
+                <a:cubicBezTo>
+                  <a:pt x="201661" y="152993"/>
+                  <a:pt x="119303" y="162229"/>
+                  <a:pt x="36945" y="171466"/>
+                </a:cubicBezTo>
+              </a:path>
+            </a:pathLst>
+          </a:custGeom>
+          <a:ln w="19050">
+            <a:solidFill>
+              <a:srgbClr val="00B050"/>
+            </a:solidFill>
+            <a:headEnd type="arrow" w="med" len="med"/>
+            <a:tailEnd type="none" w="med" len="med"/>
+          </a:ln>
+        </p:spPr>
+        <p:style>
+          <a:lnRef idx="1">
+            <a:schemeClr val="accent1"/>
+          </a:lnRef>
+          <a:fillRef idx="0">
+            <a:schemeClr val="accent1"/>
+          </a:fillRef>
+          <a:effectRef idx="0">
+            <a:schemeClr val="accent1"/>
+          </a:effectRef>
+          <a:fontRef idx="minor">
+            <a:schemeClr val="tx1"/>
+          </a:fontRef>
+        </p:style>
+        <p:txBody>
+          <a:bodyPr rtlCol="0" anchor="ctr"/>
+          <a:lstStyle/>
+          <a:p>
+            <a:pPr algn="ctr"/>
+            <a:endParaRPr lang="en-SG"/>
+          </a:p>
+        </p:txBody>
+      </p:sp>
+      <p:sp>
+        <p:nvSpPr>
+          <p:cNvPr id="25" name="Rectangle 24">
+            <a:extLst>
+              <a:ext uri="{FF2B5EF4-FFF2-40B4-BE49-F238E27FC236}">
+                <a16:creationId xmlns:a16="http://schemas.microsoft.com/office/drawing/2014/main" id="{01192CE4-3878-FA44-B033-9EB2E370A0FC}"/>
+              </a:ext>
+            </a:extLst>
+          </p:cNvPr>
+          <p:cNvSpPr/>
+          <p:nvPr/>
+        </p:nvSpPr>
+        <p:spPr>
+          <a:xfrm flipV="1">
+            <a:off x="6319511" y="3752644"/>
+            <a:ext cx="94705" cy="281185"/>
+          </a:xfrm>
+          <a:prstGeom prst="rect">
+            <a:avLst/>
+          </a:prstGeom>
+          <a:solidFill>
+            <a:srgbClr val="00B050"/>
+          </a:solidFill>
+          <a:ln>
+            <a:solidFill>
+              <a:schemeClr val="bg1"/>
+            </a:solidFill>
+          </a:ln>
+          <a:effectLst/>
+        </p:spPr>
+        <p:style>
+          <a:lnRef idx="1">
+            <a:schemeClr val="accent3"/>
+          </a:lnRef>
+          <a:fillRef idx="2">
+            <a:schemeClr val="accent3"/>
+          </a:fillRef>
+          <a:effectRef idx="1">
+            <a:schemeClr val="accent3"/>
+          </a:effectRef>
+          <a:fontRef idx="minor">
+            <a:schemeClr val="dk1"/>
+          </a:fontRef>
+        </p:style>
+        <p:txBody>
+          <a:bodyPr rtlCol="0" anchor="ctr"/>
+          <a:lstStyle/>
+          <a:p>
+            <a:pPr algn="ctr"/>
+            <a:endParaRPr lang="en-SG" sz="1400">
+              <a:solidFill>
+                <a:schemeClr val="dk1"/>
+              </a:solidFill>
+            </a:endParaRPr>
+          </a:p>
+        </p:txBody>
+      </p:sp>
     </p:spTree>
     <p:extLst>
       <p:ext uri="{BB962C8B-B14F-4D97-AF65-F5344CB8AC3E}">
@@ -5927,13 +6018,8 @@
             <a:pPr algn="ctr"/>
             <a:r>
               <a:rPr lang="en-SG" sz="1400" dirty="0"/>
-              <a:t>Reset time time-based fields and </a:t>
-            </a:r>
-            <a:r>
-              <a:rPr lang="en-SG" sz="1400" dirty="0" err="1"/>
-              <a:t>nextDayBreakPoint</a:t>
-            </a:r>
-            <a:endParaRPr lang="en-SG" sz="1400" dirty="0"/>
+              <a:t>Reset daily time-based fields and nextDayBreakPoint</a:t>
+            </a:r>
           </a:p>
           <a:p>
             <a:pPr algn="ctr"/>
@@ -6421,23 +6507,7 @@
             <a:pPr algn="ctr"/>
             <a:r>
               <a:rPr lang="en-SG" sz="1400" dirty="0"/>
-              <a:t>New </a:t>
-            </a:r>
-            <a:r>
-              <a:rPr lang="en-SG" sz="1400" dirty="0" err="1"/>
-              <a:t>xp</a:t>
-            </a:r>
-            <a:r>
-              <a:rPr lang="en-SG" sz="1400" dirty="0"/>
-              <a:t> added to </a:t>
-            </a:r>
-            <a:r>
-              <a:rPr lang="en-SG" sz="1400" dirty="0" err="1"/>
-              <a:t>AchievementRecord</a:t>
-            </a:r>
-            <a:r>
-              <a:rPr lang="en-SG" sz="1400" dirty="0"/>
-              <a:t> </a:t>
+              <a:t>New xp added to AchievementRecord </a:t>
             </a:r>
           </a:p>
         </p:txBody>
@@ -6531,18 +6601,9 @@
           <a:p>
             <a:pPr algn="ctr"/>
             <a:r>
-              <a:rPr lang="en-SG" sz="1400" dirty="0" err="1"/>
-              <a:t>AchievementRecord</a:t>
-            </a:r>
-            <a:r>
               <a:rPr lang="en-SG" sz="1400" dirty="0"/>
-              <a:t> checks current date against </a:t>
-            </a:r>
-            <a:r>
-              <a:rPr lang="en-SG" sz="1400" dirty="0" err="1"/>
-              <a:t>nextDayBreakPoint</a:t>
-            </a:r>
-            <a:endParaRPr lang="en-SG" sz="1400" dirty="0"/>
+              <a:t>AchievementRecord checks current date against nextDayBreakPoint</a:t>
+            </a:r>
           </a:p>
         </p:txBody>
       </p:sp>
@@ -6576,15 +6637,7 @@
           <a:p>
             <a:r>
               <a:rPr lang="en-US" sz="1200" dirty="0"/>
-              <a:t>[current date has passed </a:t>
-            </a:r>
-            <a:r>
-              <a:rPr lang="en-US" sz="1200" dirty="0" err="1"/>
-              <a:t>nextDayBreakPoint</a:t>
-            </a:r>
-            <a:r>
-              <a:rPr lang="en-US" sz="1200" dirty="0"/>
-              <a:t>]</a:t>
+              <a:t>[current date has passed nextDayBreakPoint]</a:t>
             </a:r>
           </a:p>
         </p:txBody>
@@ -6825,7 +6878,7 @@
           <a:p>
             <a:pPr algn="ctr"/>
             <a:r>
-              <a:rPr lang="en-US" sz="1050" dirty="0" err="1">
+              <a:rPr lang="en-US" sz="1050" dirty="0">
                 <a:solidFill>
                   <a:schemeClr val="bg1"/>
                 </a:solidFill>
@@ -6890,7 +6943,7 @@
           <a:p>
             <a:pPr algn="ctr"/>
             <a:r>
-              <a:rPr lang="en-US" sz="1050" dirty="0" err="1">
+              <a:rPr lang="en-US" sz="1050" dirty="0">
                 <a:solidFill>
                   <a:schemeClr val="bg1"/>
                 </a:solidFill>
@@ -7435,7 +7488,7 @@
           <a:p>
             <a:pPr algn="ctr"/>
             <a:r>
-              <a:rPr lang="en-US" sz="1050" dirty="0" err="1">
+              <a:rPr lang="en-US" sz="1050" dirty="0">
                 <a:solidFill>
                   <a:srgbClr val="7030A0"/>
                 </a:solidFill>
@@ -7868,7 +7921,7 @@
           <a:p>
             <a:pPr algn="ctr"/>
             <a:r>
-              <a:rPr lang="en-US" sz="1050" dirty="0" err="1">
+              <a:rPr lang="en-US" sz="1050" dirty="0">
                 <a:solidFill>
                   <a:srgbClr val="7030A0"/>
                 </a:solidFill>
@@ -7976,7 +8029,7 @@
           <a:p>
             <a:pPr algn="ctr"/>
             <a:r>
-              <a:rPr lang="en-US" sz="1050" dirty="0" err="1">
+              <a:rPr lang="en-US" sz="1050" dirty="0">
                 <a:solidFill>
                   <a:srgbClr val="7030A0"/>
                 </a:solidFill>
@@ -8304,7 +8357,7 @@
               </a:rPr>
             </a:br>
             <a:r>
-              <a:rPr lang="en-US" sz="1050" dirty="0" err="1">
+              <a:rPr lang="en-US" sz="1050" dirty="0">
                 <a:solidFill>
                   <a:srgbClr val="7030A0"/>
                 </a:solidFill>
@@ -8419,14 +8472,14 @@
               <a:t>&lt;&lt;interface&gt;&gt;</a:t>
             </a:r>
             <a:br>
-              <a:rPr lang="en-US" sz="1050">
+              <a:rPr lang="en-US" sz="1050" dirty="0">
                 <a:solidFill>
                   <a:srgbClr val="7030A0"/>
                 </a:solidFill>
               </a:rPr>
             </a:br>
             <a:r>
-              <a:rPr lang="en-US" sz="1050" dirty="0" err="1">
+              <a:rPr lang="en-US" sz="1050" dirty="0">
                 <a:solidFill>
                   <a:srgbClr val="7030A0"/>
                 </a:solidFill>
@@ -8913,7 +8966,7 @@
           <a:p>
             <a:pPr algn="ctr"/>
             <a:r>
-              <a:rPr lang="en-US" sz="1050" dirty="0" err="1">
+              <a:rPr lang="en-US" sz="1050" dirty="0">
                 <a:solidFill>
                   <a:srgbClr val="7030A0"/>
                 </a:solidFill>
@@ -9077,68 +9130,6 @@
           </a:fontRef>
         </p:style>
       </p:cxnSp>
-      <p:sp>
-        <p:nvSpPr>
-          <p:cNvPr id="49" name="Rectangle 8">
-            <a:extLst>
-              <a:ext uri="{FF2B5EF4-FFF2-40B4-BE49-F238E27FC236}">
-                <a16:creationId xmlns:a16="http://schemas.microsoft.com/office/drawing/2014/main" id="{99C777F4-5556-6845-8FB3-76C4D3E41CF8}"/>
-              </a:ext>
-            </a:extLst>
-          </p:cNvPr>
-          <p:cNvSpPr/>
-          <p:nvPr/>
-        </p:nvSpPr>
-        <p:spPr>
-          <a:xfrm>
-            <a:off x="7659333" y="3569797"/>
-            <a:ext cx="898202" cy="285783"/>
-          </a:xfrm>
-          <a:prstGeom prst="rect">
-            <a:avLst/>
-          </a:prstGeom>
-          <a:ln w="19050">
-            <a:solidFill>
-              <a:srgbClr val="7030A0"/>
-            </a:solidFill>
-          </a:ln>
-          <a:effectLst/>
-        </p:spPr>
-        <p:style>
-          <a:lnRef idx="1">
-            <a:schemeClr val="accent4"/>
-          </a:lnRef>
-          <a:fillRef idx="2">
-            <a:schemeClr val="accent4"/>
-          </a:fillRef>
-          <a:effectRef idx="1">
-            <a:schemeClr val="accent4"/>
-          </a:effectRef>
-          <a:fontRef idx="minor">
-            <a:schemeClr val="dk1"/>
-          </a:fontRef>
-        </p:style>
-        <p:txBody>
-          <a:bodyPr rtlCol="0" anchor="ctr"/>
-          <a:lstStyle/>
-          <a:p>
-            <a:pPr algn="ctr"/>
-            <a:r>
-              <a:rPr lang="en-US" sz="1050" dirty="0">
-                <a:solidFill>
-                  <a:srgbClr val="7030A0"/>
-                </a:solidFill>
-              </a:rPr>
-              <a:t>Description</a:t>
-            </a:r>
-            <a:endParaRPr lang="en-SG" sz="1050" dirty="0">
-              <a:solidFill>
-                <a:srgbClr val="7030A0"/>
-              </a:solidFill>
-            </a:endParaRPr>
-          </a:p>
-        </p:txBody>
-      </p:sp>
       <p:sp>
         <p:nvSpPr>
           <p:cNvPr id="50" name="Rectangle 8">
@@ -9595,7 +9586,7 @@
           <a:p>
             <a:pPr algn="ctr"/>
             <a:r>
-              <a:rPr lang="en-US" sz="1050" dirty="0" err="1">
+              <a:rPr lang="en-US" sz="1050" dirty="0">
                 <a:solidFill>
                   <a:srgbClr val="7030A0"/>
                 </a:solidFill>

</xml_diff>